<commit_message>
tweak slides a little
Added comment about a complexity thing, and removed the information gain
ratio slides. We aren't really doing any multi-split stuff, certainly
not in sklearn.
</commit_message>
<xml_diff>
--- a/16-trees/slides.pptx
+++ b/16-trees/slides.pptx
@@ -6,7 +6,7 @@
     <p:sldMasterId id="2147483649" r:id="rId2"/>
   </p:sldMasterIdLst>
   <p:notesMasterIdLst>
-    <p:notesMasterId r:id="rId86"/>
+    <p:notesMasterId r:id="rId84"/>
   </p:notesMasterIdLst>
   <p:sldIdLst>
     <p:sldId id="258" r:id="rId3"/>
@@ -77,21 +77,19 @@
     <p:sldId id="983" r:id="rId68"/>
     <p:sldId id="984" r:id="rId69"/>
     <p:sldId id="985" r:id="rId70"/>
-    <p:sldId id="987" r:id="rId71"/>
-    <p:sldId id="991" r:id="rId72"/>
-    <p:sldId id="1004" r:id="rId73"/>
-    <p:sldId id="988" r:id="rId74"/>
-    <p:sldId id="989" r:id="rId75"/>
-    <p:sldId id="990" r:id="rId76"/>
-    <p:sldId id="992" r:id="rId77"/>
-    <p:sldId id="993" r:id="rId78"/>
-    <p:sldId id="998" r:id="rId79"/>
-    <p:sldId id="995" r:id="rId80"/>
-    <p:sldId id="997" r:id="rId81"/>
-    <p:sldId id="999" r:id="rId82"/>
-    <p:sldId id="1005" r:id="rId83"/>
-    <p:sldId id="1006" r:id="rId84"/>
-    <p:sldId id="504" r:id="rId85"/>
+    <p:sldId id="1004" r:id="rId71"/>
+    <p:sldId id="988" r:id="rId72"/>
+    <p:sldId id="989" r:id="rId73"/>
+    <p:sldId id="990" r:id="rId74"/>
+    <p:sldId id="992" r:id="rId75"/>
+    <p:sldId id="993" r:id="rId76"/>
+    <p:sldId id="998" r:id="rId77"/>
+    <p:sldId id="995" r:id="rId78"/>
+    <p:sldId id="997" r:id="rId79"/>
+    <p:sldId id="999" r:id="rId80"/>
+    <p:sldId id="1005" r:id="rId81"/>
+    <p:sldId id="1006" r:id="rId82"/>
+    <p:sldId id="504" r:id="rId83"/>
   </p:sldIdLst>
   <p:sldSz cx="9363075" cy="5257800"/>
   <p:notesSz cx="6858000" cy="9144000"/>
@@ -314,7 +312,7 @@
           <a:p>
             <a:fld id="{DB92F479-4B50-F243-9713-1B12EC2B4BDB}" type="datetimeFigureOut">
               <a:rPr lang="en-US" smtClean="0"/>
-              <a:t>4/20/14</a:t>
+              <a:t>9/15/14</a:t>
             </a:fld>
             <a:endParaRPr lang="en-US"/>
           </a:p>
@@ -2125,7 +2123,7 @@
               <a:defRPr/>
             </a:pPr>
             <a:r>
-              <a:rPr lang="en-US" sz="1200" baseline="0" smtClean="0">
+              <a:rPr lang="en-US" sz="1200" baseline="0" dirty="0" smtClean="0">
                 <a:solidFill>
                   <a:prstClr val="black"/>
                 </a:solidFill>
@@ -2133,6 +2131,16 @@
                 <a:sym typeface="Wingdings"/>
               </a:rPr>
               <a:t> </a:t>
+            </a:r>
+            <a:r>
+              <a:rPr lang="en-US" sz="1200" baseline="0" dirty="0" smtClean="0">
+                <a:solidFill>
+                  <a:prstClr val="black"/>
+                </a:solidFill>
+                <a:latin typeface="ArialMT"/>
+                <a:sym typeface="Wingdings"/>
+              </a:rPr>
+              <a:t>I think this the time complexity is actually worse, and might be more intuitively shown, as factorial in the number of data values. Is there a source that this O(2^n) is coming from?</a:t>
             </a:r>
             <a:endParaRPr lang="en-US" sz="1200" baseline="0" dirty="0" smtClean="0">
               <a:solidFill>
@@ -6420,13 +6428,6 @@
               </a:rPr>
               <a:t>(Think about what these are for the 50/50 and 0/1 cases mentioned earlier.)</a:t>
             </a:r>
-            <a:endParaRPr lang="en-US" sz="1200" baseline="0" dirty="0" smtClean="0">
-              <a:solidFill>
-                <a:prstClr val="black"/>
-              </a:solidFill>
-              <a:latin typeface="ArialMT"/>
-              <a:sym typeface="Wingdings"/>
-            </a:endParaRPr>
           </a:p>
         </p:txBody>
       </p:sp>
@@ -7830,33 +7831,11 @@
           <a:bodyPr/>
           <a:lstStyle/>
           <a:p>
-            <a:pPr marL="0" marR="0" indent="0" algn="l" defTabSz="457200" rtl="0" eaLnBrk="1" fontAlgn="auto" latinLnBrk="0" hangingPunct="1">
-              <a:lnSpc>
-                <a:spcPct val="100000"/>
-              </a:lnSpc>
-              <a:spcBef>
-                <a:spcPts val="0"/>
-              </a:spcBef>
-              <a:spcAft>
-                <a:spcPts val="0"/>
-              </a:spcAft>
-              <a:buClrTx/>
-              <a:buSzTx/>
-              <a:buFontTx/>
-              <a:buNone/>
-              <a:tabLst/>
-              <a:defRPr/>
-            </a:pPr>
-            <a:r>
-              <a:rPr lang="en-US" sz="1200" baseline="0" dirty="0" smtClean="0">
-                <a:solidFill>
-                  <a:prstClr val="black"/>
-                </a:solidFill>
-                <a:latin typeface="ArialMT"/>
-                <a:sym typeface="Wingdings"/>
-              </a:rPr>
-              <a:t> </a:t>
-            </a:r>
+            <a:r>
+              <a:rPr lang="en-US" dirty="0" smtClean="0"/>
+              <a:t>  </a:t>
+            </a:r>
+            <a:endParaRPr lang="en-US" dirty="0"/>
           </a:p>
         </p:txBody>
       </p:sp>
@@ -7886,7 +7865,7 @@
     </p:spTree>
     <p:extLst>
       <p:ext uri="{BB962C8B-B14F-4D97-AF65-F5344CB8AC3E}">
-        <p14:creationId xmlns:p14="http://schemas.microsoft.com/office/powerpoint/2010/main" val="645762702"/>
+        <p14:creationId xmlns:p14="http://schemas.microsoft.com/office/powerpoint/2010/main" val="158773868"/>
       </p:ext>
     </p:extLst>
   </p:cSld>
@@ -8160,11 +8139,33 @@
           <a:bodyPr/>
           <a:lstStyle/>
           <a:p>
-            <a:r>
-              <a:rPr lang="en-US" dirty="0" smtClean="0"/>
-              <a:t>  </a:t>
-            </a:r>
-            <a:endParaRPr lang="en-US" dirty="0"/>
+            <a:pPr marL="0" marR="0" indent="0" algn="l" defTabSz="457200" rtl="0" eaLnBrk="1" fontAlgn="auto" latinLnBrk="0" hangingPunct="1">
+              <a:lnSpc>
+                <a:spcPct val="100000"/>
+              </a:lnSpc>
+              <a:spcBef>
+                <a:spcPts val="0"/>
+              </a:spcBef>
+              <a:spcAft>
+                <a:spcPts val="0"/>
+              </a:spcAft>
+              <a:buClrTx/>
+              <a:buSzTx/>
+              <a:buFontTx/>
+              <a:buNone/>
+              <a:tabLst/>
+              <a:defRPr/>
+            </a:pPr>
+            <a:r>
+              <a:rPr lang="en-US" sz="1200" baseline="0" dirty="0" smtClean="0">
+                <a:solidFill>
+                  <a:prstClr val="black"/>
+                </a:solidFill>
+                <a:latin typeface="ArialMT"/>
+                <a:sym typeface="Wingdings"/>
+              </a:rPr>
+              <a:t>Why wouldn’t you want to do this?</a:t>
+            </a:r>
           </a:p>
         </p:txBody>
       </p:sp>
@@ -8194,7 +8195,7 @@
     </p:spTree>
     <p:extLst>
       <p:ext uri="{BB962C8B-B14F-4D97-AF65-F5344CB8AC3E}">
-        <p14:creationId xmlns:p14="http://schemas.microsoft.com/office/powerpoint/2010/main" val="158773868"/>
+        <p14:creationId xmlns:p14="http://schemas.microsoft.com/office/powerpoint/2010/main" val="645762702"/>
       </p:ext>
     </p:extLst>
   </p:cSld>
@@ -8383,7 +8384,7 @@
                 <a:latin typeface="ArialMT"/>
                 <a:sym typeface="Wingdings"/>
               </a:rPr>
-              <a:t>Why wouldn’t you want to do this?</a:t>
+              <a:t> </a:t>
             </a:r>
           </a:p>
         </p:txBody>
@@ -9348,31 +9349,8 @@
           <a:bodyPr/>
           <a:lstStyle/>
           <a:p>
-            <a:pPr marL="0" marR="0" indent="0" algn="l" defTabSz="457200" rtl="0" eaLnBrk="1" fontAlgn="auto" latinLnBrk="0" hangingPunct="1">
-              <a:lnSpc>
-                <a:spcPct val="100000"/>
-              </a:lnSpc>
-              <a:spcBef>
-                <a:spcPts val="0"/>
-              </a:spcBef>
-              <a:spcAft>
-                <a:spcPts val="0"/>
-              </a:spcAft>
-              <a:buClrTx/>
-              <a:buSzTx/>
-              <a:buFontTx/>
-              <a:buNone/>
-              <a:tabLst/>
-              <a:defRPr/>
-            </a:pPr>
-            <a:r>
-              <a:rPr lang="en-US" sz="1200" baseline="0" dirty="0" smtClean="0">
-                <a:solidFill>
-                  <a:prstClr val="black"/>
-                </a:solidFill>
-                <a:latin typeface="ArialMT"/>
-                <a:sym typeface="Wingdings"/>
-              </a:rPr>
+            <a:r>
+              <a:rPr lang="en-US" baseline="0" dirty="0" smtClean="0"/>
               <a:t> </a:t>
             </a:r>
           </a:p>
@@ -9396,203 +9374,6 @@
             <a:fld id="{ADD4B5B7-85EF-4E48-AC80-2380FACD9C23}" type="slidenum">
               <a:rPr lang="en-US" smtClean="0"/>
               <a:t>81</a:t>
-            </a:fld>
-            <a:endParaRPr lang="en-US"/>
-          </a:p>
-        </p:txBody>
-      </p:sp>
-    </p:spTree>
-    <p:extLst>
-      <p:ext uri="{BB962C8B-B14F-4D97-AF65-F5344CB8AC3E}">
-        <p14:creationId xmlns:p14="http://schemas.microsoft.com/office/powerpoint/2010/main" val="645762702"/>
-      </p:ext>
-    </p:extLst>
-  </p:cSld>
-  <p:clrMapOvr>
-    <a:masterClrMapping/>
-  </p:clrMapOvr>
-</p:notes>
-</file>
-
-<file path=ppt/notesSlides/notesSlide82.xml><?xml version="1.0" encoding="utf-8"?>
-<p:notes xmlns:a="http://schemas.openxmlformats.org/drawingml/2006/main" xmlns:r="http://schemas.openxmlformats.org/officeDocument/2006/relationships" xmlns:p="http://schemas.openxmlformats.org/presentationml/2006/main">
-  <p:cSld>
-    <p:spTree>
-      <p:nvGrpSpPr>
-        <p:cNvPr id="1" name=""/>
-        <p:cNvGrpSpPr/>
-        <p:nvPr/>
-      </p:nvGrpSpPr>
-      <p:grpSpPr>
-        <a:xfrm>
-          <a:off x="0" y="0"/>
-          <a:ext cx="0" cy="0"/>
-          <a:chOff x="0" y="0"/>
-          <a:chExt cx="0" cy="0"/>
-        </a:xfrm>
-      </p:grpSpPr>
-      <p:sp>
-        <p:nvSpPr>
-          <p:cNvPr id="2" name="Slide Image Placeholder 1"/>
-          <p:cNvSpPr>
-            <a:spLocks noGrp="1" noRot="1" noChangeAspect="1"/>
-          </p:cNvSpPr>
-          <p:nvPr>
-            <p:ph type="sldImg"/>
-          </p:nvPr>
-        </p:nvSpPr>
-        <p:spPr/>
-      </p:sp>
-      <p:sp>
-        <p:nvSpPr>
-          <p:cNvPr id="3" name="Notes Placeholder 2"/>
-          <p:cNvSpPr>
-            <a:spLocks noGrp="1"/>
-          </p:cNvSpPr>
-          <p:nvPr>
-            <p:ph type="body" idx="1"/>
-          </p:nvPr>
-        </p:nvSpPr>
-        <p:spPr/>
-        <p:txBody>
-          <a:bodyPr/>
-          <a:lstStyle/>
-          <a:p>
-            <a:pPr marL="0" marR="0" indent="0" algn="l" defTabSz="457200" rtl="0" eaLnBrk="1" fontAlgn="auto" latinLnBrk="0" hangingPunct="1">
-              <a:lnSpc>
-                <a:spcPct val="100000"/>
-              </a:lnSpc>
-              <a:spcBef>
-                <a:spcPts val="0"/>
-              </a:spcBef>
-              <a:spcAft>
-                <a:spcPts val="0"/>
-              </a:spcAft>
-              <a:buClrTx/>
-              <a:buSzTx/>
-              <a:buFontTx/>
-              <a:buNone/>
-              <a:tabLst/>
-              <a:defRPr/>
-            </a:pPr>
-            <a:r>
-              <a:rPr lang="en-US" sz="1200" baseline="0" dirty="0" smtClean="0">
-                <a:solidFill>
-                  <a:prstClr val="black"/>
-                </a:solidFill>
-                <a:latin typeface="ArialMT"/>
-                <a:sym typeface="Wingdings"/>
-              </a:rPr>
-              <a:t> </a:t>
-            </a:r>
-          </a:p>
-        </p:txBody>
-      </p:sp>
-      <p:sp>
-        <p:nvSpPr>
-          <p:cNvPr id="4" name="Slide Number Placeholder 3"/>
-          <p:cNvSpPr>
-            <a:spLocks noGrp="1"/>
-          </p:cNvSpPr>
-          <p:nvPr>
-            <p:ph type="sldNum" sz="quarter" idx="10"/>
-          </p:nvPr>
-        </p:nvSpPr>
-        <p:spPr/>
-        <p:txBody>
-          <a:bodyPr/>
-          <a:lstStyle/>
-          <a:p>
-            <a:fld id="{ADD4B5B7-85EF-4E48-AC80-2380FACD9C23}" type="slidenum">
-              <a:rPr lang="en-US" smtClean="0"/>
-              <a:t>82</a:t>
-            </a:fld>
-            <a:endParaRPr lang="en-US"/>
-          </a:p>
-        </p:txBody>
-      </p:sp>
-    </p:spTree>
-    <p:extLst>
-      <p:ext uri="{BB962C8B-B14F-4D97-AF65-F5344CB8AC3E}">
-        <p14:creationId xmlns:p14="http://schemas.microsoft.com/office/powerpoint/2010/main" val="645762702"/>
-      </p:ext>
-    </p:extLst>
-  </p:cSld>
-  <p:clrMapOvr>
-    <a:masterClrMapping/>
-  </p:clrMapOvr>
-</p:notes>
-</file>
-
-<file path=ppt/notesSlides/notesSlide83.xml><?xml version="1.0" encoding="utf-8"?>
-<p:notes xmlns:a="http://schemas.openxmlformats.org/drawingml/2006/main" xmlns:r="http://schemas.openxmlformats.org/officeDocument/2006/relationships" xmlns:p="http://schemas.openxmlformats.org/presentationml/2006/main">
-  <p:cSld>
-    <p:spTree>
-      <p:nvGrpSpPr>
-        <p:cNvPr id="1" name=""/>
-        <p:cNvGrpSpPr/>
-        <p:nvPr/>
-      </p:nvGrpSpPr>
-      <p:grpSpPr>
-        <a:xfrm>
-          <a:off x="0" y="0"/>
-          <a:ext cx="0" cy="0"/>
-          <a:chOff x="0" y="0"/>
-          <a:chExt cx="0" cy="0"/>
-        </a:xfrm>
-      </p:grpSpPr>
-      <p:sp>
-        <p:nvSpPr>
-          <p:cNvPr id="2" name="Slide Image Placeholder 1"/>
-          <p:cNvSpPr>
-            <a:spLocks noGrp="1" noRot="1" noChangeAspect="1"/>
-          </p:cNvSpPr>
-          <p:nvPr>
-            <p:ph type="sldImg"/>
-          </p:nvPr>
-        </p:nvSpPr>
-        <p:spPr/>
-      </p:sp>
-      <p:sp>
-        <p:nvSpPr>
-          <p:cNvPr id="3" name="Notes Placeholder 2"/>
-          <p:cNvSpPr>
-            <a:spLocks noGrp="1"/>
-          </p:cNvSpPr>
-          <p:nvPr>
-            <p:ph type="body" idx="1"/>
-          </p:nvPr>
-        </p:nvSpPr>
-        <p:spPr/>
-        <p:txBody>
-          <a:bodyPr/>
-          <a:lstStyle/>
-          <a:p>
-            <a:r>
-              <a:rPr lang="en-US" baseline="0" dirty="0" smtClean="0"/>
-              <a:t> </a:t>
-            </a:r>
-          </a:p>
-        </p:txBody>
-      </p:sp>
-      <p:sp>
-        <p:nvSpPr>
-          <p:cNvPr id="4" name="Slide Number Placeholder 3"/>
-          <p:cNvSpPr>
-            <a:spLocks noGrp="1"/>
-          </p:cNvSpPr>
-          <p:nvPr>
-            <p:ph type="sldNum" sz="quarter" idx="10"/>
-          </p:nvPr>
-        </p:nvSpPr>
-        <p:spPr/>
-        <p:txBody>
-          <a:bodyPr/>
-          <a:lstStyle/>
-          <a:p>
-            <a:fld id="{ADD4B5B7-85EF-4E48-AC80-2380FACD9C23}" type="slidenum">
-              <a:rPr lang="en-US" smtClean="0"/>
-              <a:t>83</a:t>
             </a:fld>
             <a:endParaRPr lang="en-US"/>
           </a:p>
@@ -21376,19 +21157,8 @@
                 <a:latin typeface="PFDinTextCompPro-Italic"/>
                 <a:cs typeface="PFDinTextCompPro-Italic"/>
               </a:rPr>
-              <a:t>The partitioning decision is made at each node according to a </a:t>
-            </a:r>
-            <a:r>
-              <a:rPr lang="en-US" sz="3000" dirty="0" smtClean="0">
-                <a:latin typeface="PFDinTextCompPro-Italic"/>
-                <a:cs typeface="PFDinTextCompPro-Italic"/>
-              </a:rPr>
-              <a:t>purity metric.</a:t>
-            </a:r>
-            <a:endParaRPr lang="en-US" sz="3000" dirty="0" smtClean="0">
-              <a:latin typeface="PFDinTextCompPro-Italic"/>
-              <a:cs typeface="PFDinTextCompPro-Italic"/>
-            </a:endParaRPr>
+              <a:t>The partitioning decision is made at each node according to a purity metric.</a:t>
+            </a:r>
           </a:p>
           <a:p>
             <a:pPr algn="l"/>
@@ -30352,228 +30122,84 @@
       </p:grpSpPr>
       <p:sp>
         <p:nvSpPr>
-          <p:cNvPr id="4" name="Content Placeholder 3"/>
-          <p:cNvSpPr>
-            <a:spLocks noGrp="1"/>
-          </p:cNvSpPr>
-          <p:nvPr>
-            <p:ph sz="quarter" idx="11"/>
+          <p:cNvPr id="2" name="Title 1"/>
+          <p:cNvSpPr>
+            <a:spLocks noGrp="1"/>
+          </p:cNvSpPr>
+          <p:nvPr>
+            <p:ph type="title"/>
           </p:nvPr>
         </p:nvSpPr>
         <p:spPr>
           <a:xfrm>
-            <a:off x="414337" y="495300"/>
+            <a:off x="347663" y="3238500"/>
+            <a:ext cx="8426450" cy="1828800"/>
+          </a:xfrm>
+        </p:spPr>
+        <p:txBody>
+          <a:bodyPr/>
+          <a:lstStyle/>
+          <a:p>
+            <a:pPr>
+              <a:defRPr/>
+            </a:pPr>
+            <a:r>
+              <a:rPr lang="en-US" sz="7500" dirty="0" smtClean="0"/>
+              <a:t>IV. Preventing </a:t>
+            </a:r>
+            <a:r>
+              <a:rPr lang="en-US" sz="7500" dirty="0" err="1" smtClean="0"/>
+              <a:t>overfitting</a:t>
+            </a:r>
+            <a:endParaRPr lang="en-US" sz="7500" dirty="0"/>
+          </a:p>
+        </p:txBody>
+      </p:sp>
+      <p:sp>
+        <p:nvSpPr>
+          <p:cNvPr id="4" name="Content Placeholder 3"/>
+          <p:cNvSpPr>
+            <a:spLocks noGrp="1"/>
+          </p:cNvSpPr>
+          <p:nvPr>
+            <p:ph sz="quarter" idx="11"/>
+          </p:nvPr>
+        </p:nvSpPr>
+        <p:spPr>
+          <a:xfrm>
+            <a:off x="371475" y="495300"/>
             <a:ext cx="6400800" cy="304800"/>
           </a:xfrm>
         </p:spPr>
         <p:txBody>
-          <a:bodyPr/>
-          <a:lstStyle/>
-          <a:p>
-            <a:pPr eaLnBrk="1" hangingPunct="1">
-              <a:lnSpc>
-                <a:spcPts val="2448"/>
-              </a:lnSpc>
-              <a:defRPr/>
-            </a:pPr>
-            <a:r>
-              <a:rPr lang="en-US" dirty="0" smtClean="0"/>
-              <a:t>Objective functions</a:t>
-            </a:r>
-          </a:p>
-        </p:txBody>
-      </p:sp>
-      <p:sp>
-        <p:nvSpPr>
-          <p:cNvPr id="8" name="Slide Number Placeholder 3"/>
-          <p:cNvSpPr>
-            <a:spLocks noGrp="1"/>
-          </p:cNvSpPr>
-          <p:nvPr>
-            <p:ph type="sldNum" sz="quarter" idx="13"/>
-          </p:nvPr>
-        </p:nvSpPr>
-        <p:spPr/>
-        <p:txBody>
-          <a:bodyPr/>
-          <a:lstStyle/>
-          <a:p>
-            <a:pPr>
-              <a:defRPr/>
-            </a:pPr>
-            <a:fld id="{BD5AD749-DAD1-6A4A-A2AA-CB20EAD0AEB7}" type="slidenum">
-              <a:rPr lang="en-US"/>
-              <a:pPr>
-                <a:defRPr/>
-              </a:pPr>
-              <a:t>69</a:t>
-            </a:fld>
-            <a:endParaRPr lang="en-US"/>
-          </a:p>
-        </p:txBody>
-      </p:sp>
-      <p:sp>
-        <p:nvSpPr>
-          <p:cNvPr id="5" name="TextBox 4"/>
-          <p:cNvSpPr txBox="1"/>
-          <p:nvPr/>
-        </p:nvSpPr>
-        <p:spPr>
-          <a:xfrm>
-            <a:off x="566737" y="1257300"/>
-            <a:ext cx="8153400" cy="2862322"/>
-          </a:xfrm>
-          <a:prstGeom prst="rect">
-            <a:avLst/>
-          </a:prstGeom>
-          <a:noFill/>
-        </p:spPr>
-        <p:txBody>
-          <a:bodyPr wrap="square" rtlCol="0">
-            <a:spAutoFit/>
+          <a:bodyPr wrap="square" lIns="91440" tIns="45720" rIns="91440" bIns="45720" numCol="1" anchor="t" anchorCtr="0" compatLnSpc="1">
+            <a:prstTxWarp prst="textNoShape">
+              <a:avLst/>
+            </a:prstTxWarp>
           </a:bodyPr>
           <a:lstStyle/>
           <a:p>
-            <a:pPr algn="l"/>
-            <a:r>
-              <a:rPr lang="en-US" sz="3000" dirty="0" smtClean="0">
-                <a:latin typeface="PFDinTextCompPro-Italic"/>
-                <a:cs typeface="PFDinTextCompPro-Italic"/>
-              </a:rPr>
-              <a:t>We can use a function of the information gain called the </a:t>
-            </a:r>
-            <a:r>
-              <a:rPr lang="en-US" sz="3000" dirty="0" smtClean="0">
-                <a:latin typeface="PFDinTextCompPro-Medium"/>
-                <a:cs typeface="PFDinTextCompPro-Medium"/>
-              </a:rPr>
-              <a:t>gain ratio</a:t>
-            </a:r>
-            <a:r>
-              <a:rPr lang="en-US" sz="3000" dirty="0" smtClean="0">
-                <a:latin typeface="PFDinTextCompPro-Italic"/>
-                <a:cs typeface="PFDinTextCompPro-Italic"/>
-              </a:rPr>
-              <a:t> to explicitly penalize high numbers of outcomes:</a:t>
-            </a:r>
-          </a:p>
-          <a:p>
-            <a:pPr algn="l"/>
-            <a:endParaRPr lang="en-US" sz="3000" dirty="0">
-              <a:latin typeface="PFDinTextCompPro-Italic"/>
-              <a:cs typeface="PFDinTextCompPro-Italic"/>
+            <a:pPr marL="0" indent="0"/>
+            <a:r>
+              <a:rPr lang="en-US" cap="none" dirty="0" smtClean="0">
+                <a:latin typeface="PFDinTextCompPro-Bold" charset="0"/>
+                <a:ea typeface="ヒラギノ角ゴ ProN W3" charset="0"/>
+                <a:cs typeface="ヒラギノ角ゴ ProN W3" charset="0"/>
+              </a:rPr>
+              <a:t>INTRO TO DATA SCIENCE</a:t>
+            </a:r>
+            <a:endParaRPr lang="en-US" cap="none" dirty="0">
+              <a:latin typeface="PFDinTextCompPro-Bold" charset="0"/>
+              <a:ea typeface="ヒラギノ角ゴ ProN W3" charset="0"/>
+              <a:cs typeface="ヒラギノ角ゴ ProN W3" charset="0"/>
             </a:endParaRPr>
           </a:p>
-          <a:p>
-            <a:pPr algn="l"/>
-            <a:endParaRPr lang="en-US" sz="3000" dirty="0" smtClean="0">
-              <a:latin typeface="PFDinTextCompPro-Italic"/>
-              <a:cs typeface="PFDinTextCompPro-Italic"/>
-            </a:endParaRPr>
-          </a:p>
-          <a:p>
-            <a:pPr algn="l"/>
-            <a:endParaRPr lang="en-US" sz="3000" dirty="0">
-              <a:latin typeface="PFDinTextCompPro-Italic"/>
-              <a:cs typeface="PFDinTextCompPro-Italic"/>
-            </a:endParaRPr>
-          </a:p>
-          <a:p>
-            <a:pPr algn="l"/>
-            <a:r>
-              <a:rPr lang="en-US" sz="3000" dirty="0" smtClean="0">
-                <a:latin typeface="PFDinTextCompPro-Italic"/>
-                <a:cs typeface="PFDinTextCompPro-Italic"/>
-              </a:rPr>
-              <a:t>(Where </a:t>
-            </a:r>
-            <a:r>
-              <a:rPr lang="en-US" sz="2500" i="1" dirty="0" smtClean="0">
-                <a:latin typeface="+mn-lt"/>
-                <a:cs typeface="PFDinTextCompPro-Italic"/>
-              </a:rPr>
-              <a:t>p(v</a:t>
-            </a:r>
-            <a:r>
-              <a:rPr lang="en-US" sz="2500" i="1" baseline="-25000" dirty="0" smtClean="0">
-                <a:latin typeface="+mn-lt"/>
-                <a:cs typeface="PFDinTextCompPro-Italic"/>
-              </a:rPr>
-              <a:t>i</a:t>
-            </a:r>
-            <a:r>
-              <a:rPr lang="en-US" sz="2500" i="1" dirty="0" smtClean="0">
-                <a:latin typeface="+mn-lt"/>
-                <a:cs typeface="PFDinTextCompPro-Italic"/>
-              </a:rPr>
-              <a:t>)</a:t>
-            </a:r>
-            <a:r>
-              <a:rPr lang="en-US" sz="3000" dirty="0" smtClean="0">
-                <a:latin typeface="PFDinTextCompPro-Italic"/>
-                <a:cs typeface="PFDinTextCompPro-Italic"/>
-              </a:rPr>
-              <a:t> refers to the probability of label </a:t>
-            </a:r>
-            <a:r>
-              <a:rPr lang="en-US" sz="2500" i="1" dirty="0" err="1" smtClean="0">
-                <a:latin typeface="+mn-lt"/>
-                <a:cs typeface="PFDinTextCompPro-Italic"/>
-              </a:rPr>
-              <a:t>i</a:t>
-            </a:r>
-            <a:r>
-              <a:rPr lang="en-US" sz="3000" dirty="0" smtClean="0">
-                <a:latin typeface="PFDinTextCompPro-Italic"/>
-                <a:cs typeface="PFDinTextCompPro-Italic"/>
-              </a:rPr>
-              <a:t> at node </a:t>
-            </a:r>
-            <a:r>
-              <a:rPr lang="en-US" sz="2500" i="1" dirty="0" smtClean="0">
-                <a:latin typeface="+mn-lt"/>
-                <a:cs typeface="PFDinTextCompPro-Italic"/>
-              </a:rPr>
-              <a:t>v</a:t>
-            </a:r>
-            <a:r>
-              <a:rPr lang="en-US" sz="3000" dirty="0" smtClean="0">
-                <a:latin typeface="PFDinTextCompPro-Italic"/>
-                <a:cs typeface="PFDinTextCompPro-Italic"/>
-              </a:rPr>
-              <a:t>)</a:t>
-            </a:r>
-          </a:p>
-        </p:txBody>
-      </p:sp>
-      <p:pic>
-        <p:nvPicPr>
-          <p:cNvPr id="2" name="Picture 1"/>
-          <p:cNvPicPr>
-            <a:picLocks noChangeAspect="1"/>
-          </p:cNvPicPr>
-          <p:nvPr/>
-        </p:nvPicPr>
-        <p:blipFill>
-          <a:blip r:embed="rId3"/>
-          <a:stretch>
-            <a:fillRect/>
-          </a:stretch>
-        </p:blipFill>
-        <p:spPr>
-          <a:xfrm>
-            <a:off x="2090737" y="2489200"/>
-            <a:ext cx="4508500" cy="901700"/>
-          </a:xfrm>
-          <a:prstGeom prst="rect">
-            <a:avLst/>
-          </a:prstGeom>
-        </p:spPr>
-      </p:pic>
+        </p:txBody>
+      </p:sp>
     </p:spTree>
     <p:extLst>
       <p:ext uri="{BB962C8B-B14F-4D97-AF65-F5344CB8AC3E}">
-        <p14:creationId xmlns:p14="http://schemas.microsoft.com/office/powerpoint/2010/main" val="3537408515"/>
+        <p14:creationId xmlns:p14="http://schemas.microsoft.com/office/powerpoint/2010/main" val="4024154321"/>
       </p:ext>
     </p:extLst>
   </p:cSld>
@@ -30832,8 +30458,13 @@
             </a:pPr>
             <a:r>
               <a:rPr lang="en-US" dirty="0" smtClean="0"/>
-              <a:t>Objective functions</a:t>
-            </a:r>
+              <a:t>Preventing </a:t>
+            </a:r>
+            <a:r>
+              <a:rPr lang="en-US" dirty="0" err="1" smtClean="0"/>
+              <a:t>overfitting</a:t>
+            </a:r>
+            <a:endParaRPr lang="en-US" dirty="0" smtClean="0"/>
           </a:p>
         </p:txBody>
       </p:sp>
@@ -30875,7 +30506,7 @@
         <p:spPr>
           <a:xfrm>
             <a:off x="566737" y="1257300"/>
-            <a:ext cx="8153400" cy="2862322"/>
+            <a:ext cx="8153400" cy="1015663"/>
           </a:xfrm>
           <a:prstGeom prst="rect">
             <a:avLst/>
@@ -30890,368 +30521,19 @@
           <a:p>
             <a:pPr algn="l"/>
             <a:r>
-              <a:rPr lang="en-US" sz="3000" dirty="0">
-                <a:latin typeface="PFDinTextCompPro-Italic"/>
-                <a:cs typeface="PFDinTextCompPro-Italic"/>
-              </a:rPr>
-              <a:t>We can use a function of the information gain called the </a:t>
-            </a:r>
-            <a:r>
-              <a:rPr lang="en-US" sz="3000" dirty="0">
-                <a:latin typeface="PFDinTextCompPro-Medium"/>
-                <a:cs typeface="PFDinTextCompPro-Medium"/>
-              </a:rPr>
-              <a:t>gain ratio</a:t>
-            </a:r>
-            <a:r>
-              <a:rPr lang="en-US" sz="3000" dirty="0">
-                <a:latin typeface="PFDinTextCompPro-Italic"/>
-                <a:cs typeface="PFDinTextCompPro-Italic"/>
-              </a:rPr>
-              <a:t> to explicitly penalize high numbers of outcomes:</a:t>
-            </a:r>
-          </a:p>
-          <a:p>
-            <a:pPr algn="l"/>
-            <a:endParaRPr lang="en-US" sz="3000" dirty="0">
-              <a:latin typeface="PFDinTextCompPro-Italic"/>
-              <a:cs typeface="PFDinTextCompPro-Italic"/>
-            </a:endParaRPr>
-          </a:p>
-          <a:p>
-            <a:pPr algn="l"/>
-            <a:endParaRPr lang="en-US" sz="3000" dirty="0" smtClean="0">
-              <a:latin typeface="PFDinTextCompPro-Italic"/>
-              <a:cs typeface="PFDinTextCompPro-Italic"/>
-            </a:endParaRPr>
-          </a:p>
-          <a:p>
-            <a:pPr algn="l"/>
-            <a:endParaRPr lang="en-US" sz="3000" dirty="0">
-              <a:latin typeface="PFDinTextCompPro-Italic"/>
-              <a:cs typeface="PFDinTextCompPro-Italic"/>
-            </a:endParaRPr>
-          </a:p>
-          <a:p>
-            <a:pPr algn="l"/>
-            <a:r>
               <a:rPr lang="en-US" sz="3000" dirty="0" smtClean="0">
                 <a:latin typeface="PFDinTextCompPro-Italic"/>
                 <a:cs typeface="PFDinTextCompPro-Italic"/>
               </a:rPr>
-              <a:t>(Where </a:t>
-            </a:r>
-            <a:r>
-              <a:rPr lang="en-US" sz="2500" i="1" dirty="0" smtClean="0">
-                <a:latin typeface="+mn-lt"/>
-                <a:cs typeface="PFDinTextCompPro-Italic"/>
-              </a:rPr>
-              <a:t>p(v</a:t>
-            </a:r>
-            <a:r>
-              <a:rPr lang="en-US" sz="2500" i="1" baseline="-25000" dirty="0" smtClean="0">
-                <a:latin typeface="+mn-lt"/>
-                <a:cs typeface="PFDinTextCompPro-Italic"/>
-              </a:rPr>
-              <a:t>i</a:t>
-            </a:r>
-            <a:r>
-              <a:rPr lang="en-US" sz="2500" i="1" dirty="0" smtClean="0">
-                <a:latin typeface="+mn-lt"/>
-                <a:cs typeface="PFDinTextCompPro-Italic"/>
-              </a:rPr>
-              <a:t>)</a:t>
-            </a:r>
-            <a:r>
-              <a:rPr lang="en-US" sz="3000" dirty="0" smtClean="0">
-                <a:latin typeface="PFDinTextCompPro-Italic"/>
-                <a:cs typeface="PFDinTextCompPro-Italic"/>
-              </a:rPr>
-              <a:t> refers to the probability of label </a:t>
-            </a:r>
-            <a:r>
-              <a:rPr lang="en-US" sz="2500" i="1" dirty="0" err="1" smtClean="0">
-                <a:latin typeface="+mn-lt"/>
-                <a:cs typeface="PFDinTextCompPro-Italic"/>
-              </a:rPr>
-              <a:t>i</a:t>
-            </a:r>
-            <a:r>
-              <a:rPr lang="en-US" sz="3000" dirty="0" smtClean="0">
-                <a:latin typeface="PFDinTextCompPro-Italic"/>
-                <a:cs typeface="PFDinTextCompPro-Italic"/>
-              </a:rPr>
-              <a:t> at node </a:t>
-            </a:r>
-            <a:r>
-              <a:rPr lang="en-US" sz="2500" i="1" dirty="0" smtClean="0">
-                <a:latin typeface="+mn-lt"/>
-                <a:cs typeface="PFDinTextCompPro-Italic"/>
-              </a:rPr>
-              <a:t>v</a:t>
-            </a:r>
-            <a:r>
-              <a:rPr lang="en-US" sz="3000" dirty="0" smtClean="0">
-                <a:latin typeface="PFDinTextCompPro-Italic"/>
-                <a:cs typeface="PFDinTextCompPro-Italic"/>
-              </a:rPr>
-              <a:t>)</a:t>
-            </a:r>
-          </a:p>
-        </p:txBody>
-      </p:sp>
-      <p:pic>
-        <p:nvPicPr>
-          <p:cNvPr id="2" name="Picture 1"/>
-          <p:cNvPicPr>
-            <a:picLocks noChangeAspect="1"/>
-          </p:cNvPicPr>
-          <p:nvPr/>
-        </p:nvPicPr>
-        <p:blipFill>
-          <a:blip r:embed="rId3"/>
-          <a:stretch>
-            <a:fillRect/>
-          </a:stretch>
-        </p:blipFill>
-        <p:spPr>
-          <a:xfrm>
-            <a:off x="2090737" y="2489200"/>
-            <a:ext cx="4508500" cy="901700"/>
-          </a:xfrm>
-          <a:prstGeom prst="rect">
-            <a:avLst/>
-          </a:prstGeom>
-        </p:spPr>
-      </p:pic>
-      <p:grpSp>
-        <p:nvGrpSpPr>
-          <p:cNvPr id="6" name="Group 26"/>
-          <p:cNvGrpSpPr>
-            <a:grpSpLocks/>
-          </p:cNvGrpSpPr>
-          <p:nvPr/>
-        </p:nvGrpSpPr>
-        <p:grpSpPr bwMode="auto">
-          <a:xfrm>
-            <a:off x="7196137" y="2019300"/>
-            <a:ext cx="1463675" cy="1463675"/>
-            <a:chOff x="0" y="0"/>
-            <a:chExt cx="1280" cy="1280"/>
-          </a:xfrm>
-        </p:grpSpPr>
-        <p:pic>
-          <p:nvPicPr>
-            <p:cNvPr id="7" name="Picture 23"/>
-            <p:cNvPicPr>
-              <a:picLocks noChangeAspect="1" noChangeArrowheads="1"/>
-            </p:cNvPicPr>
-            <p:nvPr/>
-          </p:nvPicPr>
-          <p:blipFill>
-            <a:blip r:embed="rId4">
-              <a:extLst>
-                <a:ext uri="{28A0092B-C50C-407E-A947-70E740481C1C}">
-                  <a14:useLocalDpi xmlns:a14="http://schemas.microsoft.com/office/drawing/2010/main" val="0"/>
-                </a:ext>
-              </a:extLst>
-            </a:blip>
-            <a:srcRect/>
-            <a:stretch>
-              <a:fillRect/>
-            </a:stretch>
-          </p:blipFill>
-          <p:spPr bwMode="auto">
-            <a:xfrm>
-              <a:off x="0" y="0"/>
-              <a:ext cx="1280" cy="1280"/>
-            </a:xfrm>
-            <a:prstGeom prst="rect">
-              <a:avLst/>
-            </a:prstGeom>
-            <a:noFill/>
-            <a:ln>
-              <a:noFill/>
-            </a:ln>
-            <a:extLst>
-              <a:ext uri="{909E8E84-426E-40dd-AFC4-6F175D3DCCD1}">
-                <a14:hiddenFill xmlns:a14="http://schemas.microsoft.com/office/drawing/2010/main">
-                  <a:solidFill>
-                    <a:srgbClr val="FFFFFF"/>
-                  </a:solidFill>
-                </a14:hiddenFill>
-              </a:ext>
-              <a:ext uri="{91240B29-F687-4f45-9708-019B960494DF}">
-                <a14:hiddenLine xmlns:a14="http://schemas.microsoft.com/office/drawing/2010/main" w="12700">
-                  <a:solidFill>
-                    <a:schemeClr val="tx1"/>
-                  </a:solidFill>
-                  <a:miter lim="800000"/>
-                  <a:headEnd/>
-                  <a:tailEnd/>
-                </a14:hiddenLine>
-              </a:ext>
-            </a:extLst>
-          </p:spPr>
-        </p:pic>
-        <p:sp>
-          <p:nvSpPr>
-            <p:cNvPr id="9" name="Rectangle 24"/>
-            <p:cNvSpPr>
-              <a:spLocks/>
-            </p:cNvSpPr>
-            <p:nvPr/>
-          </p:nvSpPr>
-          <p:spPr bwMode="auto">
-            <a:xfrm>
-              <a:off x="104" y="96"/>
-              <a:ext cx="1056" cy="152"/>
-            </a:xfrm>
-            <a:prstGeom prst="rect">
-              <a:avLst/>
-            </a:prstGeom>
-            <a:noFill/>
-            <a:ln>
-              <a:noFill/>
-            </a:ln>
-            <a:extLst>
-              <a:ext uri="{909E8E84-426E-40dd-AFC4-6F175D3DCCD1}">
-                <a14:hiddenFill xmlns:a14="http://schemas.microsoft.com/office/drawing/2010/main">
-                  <a:solidFill>
-                    <a:srgbClr val="FFFFFF"/>
-                  </a:solidFill>
-                </a14:hiddenFill>
-              </a:ext>
-              <a:ext uri="{91240B29-F687-4f45-9708-019B960494DF}">
-                <a14:hiddenLine xmlns:a14="http://schemas.microsoft.com/office/drawing/2010/main" w="12700">
-                  <a:solidFill>
-                    <a:schemeClr val="tx1"/>
-                  </a:solidFill>
-                  <a:miter lim="800000"/>
-                  <a:headEnd/>
-                  <a:tailEnd/>
-                </a14:hiddenLine>
-              </a:ext>
-            </a:extLst>
-          </p:spPr>
-          <p:txBody>
-            <a:bodyPr lIns="0" tIns="0" rIns="0" bIns="0"/>
-            <a:lstStyle/>
-            <a:p>
-              <a:pPr algn="l">
-                <a:lnSpc>
-                  <a:spcPct val="75000"/>
-                </a:lnSpc>
-              </a:pPr>
-              <a:r>
-                <a:rPr lang="en-US" sz="1300" dirty="0" smtClean="0">
-                  <a:solidFill>
-                    <a:schemeClr val="tx1"/>
-                  </a:solidFill>
-                  <a:latin typeface="PFDinTextCompPro-Bold" charset="0"/>
-                  <a:ea typeface="ＭＳ Ｐゴシック" charset="0"/>
-                  <a:cs typeface="ＭＳ Ｐゴシック" charset="0"/>
-                  <a:sym typeface="PFDinTextCompPro-Bold" charset="0"/>
-                </a:rPr>
-                <a:t>NOTE</a:t>
-              </a:r>
-              <a:endParaRPr lang="en-US" sz="1300" dirty="0">
-                <a:solidFill>
-                  <a:schemeClr val="tx1"/>
-                </a:solidFill>
-                <a:latin typeface="PFDinTextCompPro-Bold" charset="0"/>
-                <a:ea typeface="ＭＳ Ｐゴシック" charset="0"/>
-                <a:cs typeface="ＭＳ Ｐゴシック" charset="0"/>
-                <a:sym typeface="PFDinTextCompPro-Bold" charset="0"/>
-              </a:endParaRPr>
-            </a:p>
-          </p:txBody>
-        </p:sp>
-        <p:sp>
-          <p:nvSpPr>
-            <p:cNvPr id="10" name="Rectangle 25"/>
-            <p:cNvSpPr>
-              <a:spLocks/>
-            </p:cNvSpPr>
-            <p:nvPr/>
-          </p:nvSpPr>
-          <p:spPr bwMode="auto">
-            <a:xfrm>
-              <a:off x="104" y="264"/>
-              <a:ext cx="1056" cy="896"/>
-            </a:xfrm>
-            <a:prstGeom prst="rect">
-              <a:avLst/>
-            </a:prstGeom>
-            <a:noFill/>
-            <a:ln>
-              <a:noFill/>
-            </a:ln>
-            <a:extLst>
-              <a:ext uri="{909E8E84-426E-40dd-AFC4-6F175D3DCCD1}">
-                <a14:hiddenFill xmlns:a14="http://schemas.microsoft.com/office/drawing/2010/main">
-                  <a:solidFill>
-                    <a:srgbClr val="FFFFFF"/>
-                  </a:solidFill>
-                </a14:hiddenFill>
-              </a:ext>
-              <a:ext uri="{91240B29-F687-4f45-9708-019B960494DF}">
-                <a14:hiddenLine xmlns:a14="http://schemas.microsoft.com/office/drawing/2010/main" w="12700">
-                  <a:solidFill>
-                    <a:schemeClr val="tx1"/>
-                  </a:solidFill>
-                  <a:miter lim="800000"/>
-                  <a:headEnd/>
-                  <a:tailEnd/>
-                </a14:hiddenLine>
-              </a:ext>
-            </a:extLst>
-          </p:spPr>
-          <p:txBody>
-            <a:bodyPr lIns="0" tIns="0" rIns="0" bIns="0"/>
-            <a:lstStyle/>
-            <a:p>
-              <a:pPr algn="l">
-                <a:lnSpc>
-                  <a:spcPts val="1150"/>
-                </a:lnSpc>
-              </a:pPr>
-              <a:endParaRPr lang="en-US" sz="900" dirty="0">
-                <a:solidFill>
-                  <a:schemeClr val="tx1"/>
-                </a:solidFill>
-                <a:latin typeface="+mn-lt"/>
-                <a:ea typeface="ＭＳ Ｐゴシック" charset="0"/>
-                <a:cs typeface="PFDinTextCompPro-Italic"/>
-                <a:sym typeface="News706 BT" charset="0"/>
-              </a:endParaRPr>
-            </a:p>
-            <a:p>
-              <a:pPr algn="l">
-                <a:lnSpc>
-                  <a:spcPts val="1150"/>
-                </a:lnSpc>
-              </a:pPr>
-              <a:r>
-                <a:rPr lang="en-US" sz="900" dirty="0" smtClean="0">
-                  <a:solidFill>
-                    <a:schemeClr val="tx1"/>
-                  </a:solidFill>
-                  <a:latin typeface="+mn-lt"/>
-                  <a:ea typeface="ＭＳ Ｐゴシック" charset="0"/>
-                  <a:cs typeface="PFDinTextCompPro-Italic"/>
-                  <a:sym typeface="News706 BT" charset="0"/>
-                </a:rPr>
-                <a:t>This is a form of regularization!</a:t>
-              </a:r>
-            </a:p>
-          </p:txBody>
-        </p:sp>
-      </p:grpSp>
+              <a:t>In addition to determining splits, we also need a stopping criterion to tell us when we’re done.</a:t>
+            </a:r>
+          </a:p>
+        </p:txBody>
+      </p:sp>
     </p:spTree>
     <p:extLst>
       <p:ext uri="{BB962C8B-B14F-4D97-AF65-F5344CB8AC3E}">
-        <p14:creationId xmlns:p14="http://schemas.microsoft.com/office/powerpoint/2010/main" val="2157319133"/>
+        <p14:creationId xmlns:p14="http://schemas.microsoft.com/office/powerpoint/2010/main" val="2518243568"/>
       </p:ext>
     </p:extLst>
   </p:cSld>
@@ -31288,20 +30570,53 @@
       </p:grpSpPr>
       <p:sp>
         <p:nvSpPr>
-          <p:cNvPr id="2" name="Title 1"/>
-          <p:cNvSpPr>
-            <a:spLocks noGrp="1"/>
-          </p:cNvSpPr>
-          <p:nvPr>
-            <p:ph type="title"/>
+          <p:cNvPr id="4" name="Content Placeholder 3"/>
+          <p:cNvSpPr>
+            <a:spLocks noGrp="1"/>
+          </p:cNvSpPr>
+          <p:nvPr>
+            <p:ph sz="quarter" idx="11"/>
           </p:nvPr>
         </p:nvSpPr>
         <p:spPr>
           <a:xfrm>
-            <a:off x="347663" y="3238500"/>
-            <a:ext cx="8426450" cy="1828800"/>
+            <a:off x="414337" y="495300"/>
+            <a:ext cx="6400800" cy="304800"/>
           </a:xfrm>
         </p:spPr>
+        <p:txBody>
+          <a:bodyPr/>
+          <a:lstStyle/>
+          <a:p>
+            <a:pPr eaLnBrk="1" hangingPunct="1">
+              <a:lnSpc>
+                <a:spcPts val="2448"/>
+              </a:lnSpc>
+              <a:defRPr/>
+            </a:pPr>
+            <a:r>
+              <a:rPr lang="en-US" dirty="0"/>
+              <a:t>Preventing </a:t>
+            </a:r>
+            <a:r>
+              <a:rPr lang="en-US" dirty="0" err="1"/>
+              <a:t>overfitting</a:t>
+            </a:r>
+            <a:endParaRPr lang="en-US" dirty="0"/>
+          </a:p>
+        </p:txBody>
+      </p:sp>
+      <p:sp>
+        <p:nvSpPr>
+          <p:cNvPr id="8" name="Slide Number Placeholder 3"/>
+          <p:cNvSpPr>
+            <a:spLocks noGrp="1"/>
+          </p:cNvSpPr>
+          <p:nvPr>
+            <p:ph type="sldNum" sz="quarter" idx="13"/>
+          </p:nvPr>
+        </p:nvSpPr>
+        <p:spPr/>
         <p:txBody>
           <a:bodyPr/>
           <a:lstStyle/>
@@ -31309,63 +30624,71 @@
             <a:pPr>
               <a:defRPr/>
             </a:pPr>
-            <a:r>
-              <a:rPr lang="en-US" sz="7500" dirty="0" smtClean="0"/>
-              <a:t>IV. Preventing </a:t>
-            </a:r>
-            <a:r>
-              <a:rPr lang="en-US" sz="7500" dirty="0" err="1" smtClean="0"/>
-              <a:t>overfitting</a:t>
-            </a:r>
-            <a:endParaRPr lang="en-US" sz="7500" dirty="0"/>
-          </a:p>
-        </p:txBody>
-      </p:sp>
-      <p:sp>
-        <p:nvSpPr>
-          <p:cNvPr id="4" name="Content Placeholder 3"/>
-          <p:cNvSpPr>
-            <a:spLocks noGrp="1"/>
-          </p:cNvSpPr>
-          <p:nvPr>
-            <p:ph sz="quarter" idx="11"/>
-          </p:nvPr>
+            <a:fld id="{BD5AD749-DAD1-6A4A-A2AA-CB20EAD0AEB7}" type="slidenum">
+              <a:rPr lang="en-US"/>
+              <a:pPr>
+                <a:defRPr/>
+              </a:pPr>
+              <a:t>71</a:t>
+            </a:fld>
+            <a:endParaRPr lang="en-US"/>
+          </a:p>
+        </p:txBody>
+      </p:sp>
+      <p:sp>
+        <p:nvSpPr>
+          <p:cNvPr id="5" name="TextBox 4"/>
+          <p:cNvSpPr txBox="1"/>
+          <p:nvPr/>
         </p:nvSpPr>
         <p:spPr>
           <a:xfrm>
-            <a:off x="371475" y="495300"/>
-            <a:ext cx="6400800" cy="304800"/>
+            <a:off x="566737" y="1257300"/>
+            <a:ext cx="8153400" cy="2400657"/>
           </a:xfrm>
+          <a:prstGeom prst="rect">
+            <a:avLst/>
+          </a:prstGeom>
+          <a:noFill/>
         </p:spPr>
         <p:txBody>
-          <a:bodyPr wrap="square" lIns="91440" tIns="45720" rIns="91440" bIns="45720" numCol="1" anchor="t" anchorCtr="0" compatLnSpc="1">
-            <a:prstTxWarp prst="textNoShape">
-              <a:avLst/>
-            </a:prstTxWarp>
+          <a:bodyPr wrap="square" rtlCol="0">
+            <a:spAutoFit/>
           </a:bodyPr>
           <a:lstStyle/>
           <a:p>
-            <a:pPr marL="0" indent="0"/>
-            <a:r>
-              <a:rPr lang="en-US" cap="none" dirty="0" smtClean="0">
-                <a:latin typeface="PFDinTextCompPro-Bold" charset="0"/>
-                <a:ea typeface="ヒラギノ角ゴ ProN W3" charset="0"/>
-                <a:cs typeface="ヒラギノ角ゴ ProN W3" charset="0"/>
-              </a:rPr>
-              <a:t>INTRO TO DATA SCIENCE</a:t>
-            </a:r>
-            <a:endParaRPr lang="en-US" cap="none" dirty="0">
-              <a:latin typeface="PFDinTextCompPro-Bold" charset="0"/>
-              <a:ea typeface="ヒラギノ角ゴ ProN W3" charset="0"/>
-              <a:cs typeface="ヒラギノ角ゴ ProN W3" charset="0"/>
+            <a:pPr algn="l"/>
+            <a:r>
+              <a:rPr lang="en-US" sz="3000" dirty="0" smtClean="0">
+                <a:latin typeface="PFDinTextCompPro-Italic"/>
+                <a:cs typeface="PFDinTextCompPro-Italic"/>
+              </a:rPr>
+              <a:t>In addition to determining splits, we also need a stopping criterion to tell us when we’re done.</a:t>
+            </a:r>
+          </a:p>
+          <a:p>
+            <a:pPr algn="l"/>
+            <a:endParaRPr lang="en-US" sz="3000" dirty="0">
+              <a:latin typeface="PFDinTextCompPro-Italic"/>
+              <a:cs typeface="PFDinTextCompPro-Italic"/>
             </a:endParaRPr>
+          </a:p>
+          <a:p>
+            <a:pPr algn="l"/>
+            <a:r>
+              <a:rPr lang="en-US" sz="3000" dirty="0" smtClean="0">
+                <a:latin typeface="PFDinTextCompPro-Italic"/>
+                <a:cs typeface="PFDinTextCompPro-Italic"/>
+              </a:rPr>
+              <a:t>For example, we can stop when all records belong to the same class, or when all records have the same attributes.</a:t>
+            </a:r>
           </a:p>
         </p:txBody>
       </p:sp>
     </p:spTree>
     <p:extLst>
       <p:ext uri="{BB962C8B-B14F-4D97-AF65-F5344CB8AC3E}">
-        <p14:creationId xmlns:p14="http://schemas.microsoft.com/office/powerpoint/2010/main" val="4024154321"/>
+        <p14:creationId xmlns:p14="http://schemas.microsoft.com/office/powerpoint/2010/main" val="2328089059"/>
       </p:ext>
     </p:extLst>
   </p:cSld>
@@ -31427,14 +30750,14 @@
               <a:defRPr/>
             </a:pPr>
             <a:r>
-              <a:rPr lang="en-US" dirty="0" smtClean="0"/>
+              <a:rPr lang="en-US" dirty="0"/>
               <a:t>Preventing </a:t>
             </a:r>
             <a:r>
-              <a:rPr lang="en-US" dirty="0" err="1" smtClean="0"/>
+              <a:rPr lang="en-US" dirty="0" err="1"/>
               <a:t>overfitting</a:t>
             </a:r>
-            <a:endParaRPr lang="en-US" dirty="0" smtClean="0"/>
+            <a:endParaRPr lang="en-US" dirty="0"/>
           </a:p>
         </p:txBody>
       </p:sp>
@@ -31476,7 +30799,7 @@
         <p:spPr>
           <a:xfrm>
             <a:off x="566737" y="1257300"/>
-            <a:ext cx="8153400" cy="1015663"/>
+            <a:ext cx="8153400" cy="3323987"/>
           </a:xfrm>
           <a:prstGeom prst="rect">
             <a:avLst/>
@@ -31498,12 +30821,60 @@
               <a:t>In addition to determining splits, we also need a stopping criterion to tell us when we’re done.</a:t>
             </a:r>
           </a:p>
+          <a:p>
+            <a:pPr algn="l"/>
+            <a:endParaRPr lang="en-US" sz="3000" dirty="0">
+              <a:latin typeface="PFDinTextCompPro-Italic"/>
+              <a:cs typeface="PFDinTextCompPro-Italic"/>
+            </a:endParaRPr>
+          </a:p>
+          <a:p>
+            <a:pPr algn="l"/>
+            <a:r>
+              <a:rPr lang="en-US" sz="3000" dirty="0" smtClean="0">
+                <a:latin typeface="PFDinTextCompPro-Italic"/>
+                <a:cs typeface="PFDinTextCompPro-Italic"/>
+              </a:rPr>
+              <a:t>For example, we can stop when all records belong to the same class, or when all records have the same attributes.</a:t>
+            </a:r>
+          </a:p>
+          <a:p>
+            <a:pPr algn="l"/>
+            <a:endParaRPr lang="en-US" sz="3000" dirty="0">
+              <a:latin typeface="PFDinTextCompPro-Italic"/>
+              <a:cs typeface="PFDinTextCompPro-Italic"/>
+            </a:endParaRPr>
+          </a:p>
+          <a:p>
+            <a:pPr algn="l"/>
+            <a:r>
+              <a:rPr lang="en-US" sz="3000" dirty="0" smtClean="0">
+                <a:latin typeface="PFDinTextCompPro-Italic"/>
+                <a:cs typeface="PFDinTextCompPro-Italic"/>
+              </a:rPr>
+              <a:t>This is correct in principle, but would likely lead to </a:t>
+            </a:r>
+            <a:r>
+              <a:rPr lang="en-US" sz="3000" dirty="0" err="1" smtClean="0">
+                <a:latin typeface="PFDinTextCompPro-Italic"/>
+                <a:cs typeface="PFDinTextCompPro-Italic"/>
+              </a:rPr>
+              <a:t>overfitting</a:t>
+            </a:r>
+            <a:r>
+              <a:rPr lang="en-US" sz="3000" dirty="0" smtClean="0">
+                <a:latin typeface="PFDinTextCompPro-Italic"/>
+                <a:cs typeface="PFDinTextCompPro-Italic"/>
+              </a:rPr>
+              <a:t>.</a:t>
+            </a:r>
+          </a:p>
         </p:txBody>
       </p:sp>
     </p:spTree>
     <p:extLst>
       <p:ext uri="{BB962C8B-B14F-4D97-AF65-F5344CB8AC3E}">
-        <p14:creationId xmlns:p14="http://schemas.microsoft.com/office/powerpoint/2010/main" val="2518243568"/>
+        <p14:creationId xmlns:p14="http://schemas.microsoft.com/office/powerpoint/2010/main" val="2328089059"/>
       </p:ext>
     </p:extLst>
   </p:cSld>
@@ -31614,7 +30985,7 @@
         <p:spPr>
           <a:xfrm>
             <a:off x="566737" y="1257300"/>
-            <a:ext cx="8153400" cy="2400657"/>
+            <a:ext cx="8153400" cy="1477328"/>
           </a:xfrm>
           <a:prstGeom prst="rect">
             <a:avLst/>
@@ -31633,24 +31004,21 @@
                 <a:latin typeface="PFDinTextCompPro-Italic"/>
                 <a:cs typeface="PFDinTextCompPro-Italic"/>
               </a:rPr>
-              <a:t>In addition to determining splits, we also need a stopping criterion to tell us when we’re done.</a:t>
-            </a:r>
-          </a:p>
-          <a:p>
-            <a:pPr algn="l"/>
-            <a:endParaRPr lang="en-US" sz="3000" dirty="0">
-              <a:latin typeface="PFDinTextCompPro-Italic"/>
-              <a:cs typeface="PFDinTextCompPro-Italic"/>
-            </a:endParaRPr>
-          </a:p>
-          <a:p>
-            <a:pPr algn="l"/>
+              <a:t>One possibility is </a:t>
+            </a:r>
             <a:r>
               <a:rPr lang="en-US" sz="3000" dirty="0" smtClean="0">
-                <a:latin typeface="PFDinTextCompPro-Italic"/>
-                <a:cs typeface="PFDinTextCompPro-Italic"/>
-              </a:rPr>
-              <a:t>For example, we can stop when all records belong to the same class, or when all records have the same attributes.</a:t>
+                <a:latin typeface="PFDinTextCompPro-Medium"/>
+                <a:cs typeface="PFDinTextCompPro-Medium"/>
+              </a:rPr>
+              <a:t>pre-pruning</a:t>
+            </a:r>
+            <a:r>
+              <a:rPr lang="en-US" sz="3000" dirty="0" smtClean="0">
+                <a:latin typeface="PFDinTextCompPro-Italic"/>
+                <a:cs typeface="PFDinTextCompPro-Italic"/>
+              </a:rPr>
+              <a:t>, which involves setting a minimum threshold on the gain, and stopping when no split achieves a gain above this threshold.</a:t>
             </a:r>
           </a:p>
         </p:txBody>
@@ -31658,7 +31026,7 @@
     </p:spTree>
     <p:extLst>
       <p:ext uri="{BB962C8B-B14F-4D97-AF65-F5344CB8AC3E}">
-        <p14:creationId xmlns:p14="http://schemas.microsoft.com/office/powerpoint/2010/main" val="2328089059"/>
+        <p14:creationId xmlns:p14="http://schemas.microsoft.com/office/powerpoint/2010/main" val="4246433088"/>
       </p:ext>
     </p:extLst>
   </p:cSld>
@@ -31769,7 +31137,7 @@
         <p:spPr>
           <a:xfrm>
             <a:off x="566737" y="1257300"/>
-            <a:ext cx="8153400" cy="3323987"/>
+            <a:ext cx="8153400" cy="2862322"/>
           </a:xfrm>
           <a:prstGeom prst="rect">
             <a:avLst/>
@@ -31788,7 +31156,21 @@
                 <a:latin typeface="PFDinTextCompPro-Italic"/>
                 <a:cs typeface="PFDinTextCompPro-Italic"/>
               </a:rPr>
-              <a:t>In addition to determining splits, we also need a stopping criterion to tell us when we’re done.</a:t>
+              <a:t>One possibility is </a:t>
+            </a:r>
+            <a:r>
+              <a:rPr lang="en-US" sz="3000" dirty="0" smtClean="0">
+                <a:latin typeface="PFDinTextCompPro-Medium"/>
+                <a:cs typeface="PFDinTextCompPro-Medium"/>
+              </a:rPr>
+              <a:t>pre-pruning</a:t>
+            </a:r>
+            <a:r>
+              <a:rPr lang="en-US" sz="3000" dirty="0" smtClean="0">
+                <a:latin typeface="PFDinTextCompPro-Italic"/>
+                <a:cs typeface="PFDinTextCompPro-Italic"/>
+              </a:rPr>
+              <a:t>, which involves setting a minimum threshold on the gain, and stopping when no split achieves a gain above this threshold.</a:t>
             </a:r>
           </a:p>
           <a:p>
@@ -31805,38 +31187,21 @@
                 <a:latin typeface="PFDinTextCompPro-Italic"/>
                 <a:cs typeface="PFDinTextCompPro-Italic"/>
               </a:rPr>
-              <a:t>For example, we can stop when all records belong to the same class, or when all records have the same attributes.</a:t>
-            </a:r>
-          </a:p>
-          <a:p>
-            <a:pPr algn="l"/>
-            <a:endParaRPr lang="en-US" sz="3000" dirty="0">
-              <a:latin typeface="PFDinTextCompPro-Italic"/>
-              <a:cs typeface="PFDinTextCompPro-Italic"/>
-            </a:endParaRPr>
-          </a:p>
-          <a:p>
-            <a:pPr algn="l"/>
+              <a:t>This prevents </a:t>
+            </a:r>
+            <a:r>
+              <a:rPr lang="en-US" sz="3000" dirty="0" err="1" smtClean="0">
+                <a:latin typeface="PFDinTextCompPro-Italic"/>
+                <a:cs typeface="PFDinTextCompPro-Italic"/>
+              </a:rPr>
+              <a:t>overfitting</a:t>
+            </a:r>
             <a:r>
               <a:rPr lang="en-US" sz="3000" dirty="0" smtClean="0">
                 <a:latin typeface="PFDinTextCompPro-Italic"/>
                 <a:cs typeface="PFDinTextCompPro-Italic"/>
               </a:rPr>
-              <a:t>This is correct in principle, but would likely lead to </a:t>
-            </a:r>
-            <a:r>
-              <a:rPr lang="en-US" sz="3000" dirty="0" err="1" smtClean="0">
-                <a:latin typeface="PFDinTextCompPro-Italic"/>
-                <a:cs typeface="PFDinTextCompPro-Italic"/>
-              </a:rPr>
-              <a:t>overfitting</a:t>
-            </a:r>
-            <a:r>
-              <a:rPr lang="en-US" sz="3000" dirty="0" smtClean="0">
-                <a:latin typeface="PFDinTextCompPro-Italic"/>
-                <a:cs typeface="PFDinTextCompPro-Italic"/>
-              </a:rPr>
-              <a:t>.</a:t>
+              <a:t>, but is difficult to calibrate in practice (may preserve bias!)</a:t>
             </a:r>
           </a:p>
         </p:txBody>
@@ -31844,7 +31209,7 @@
     </p:spTree>
     <p:extLst>
       <p:ext uri="{BB962C8B-B14F-4D97-AF65-F5344CB8AC3E}">
-        <p14:creationId xmlns:p14="http://schemas.microsoft.com/office/powerpoint/2010/main" val="2328089059"/>
+        <p14:creationId xmlns:p14="http://schemas.microsoft.com/office/powerpoint/2010/main" val="1955138691"/>
       </p:ext>
     </p:extLst>
   </p:cSld>
@@ -31955,7 +31320,7 @@
         <p:spPr>
           <a:xfrm>
             <a:off x="566737" y="1257300"/>
-            <a:ext cx="8153400" cy="1477328"/>
+            <a:ext cx="8153400" cy="1015663"/>
           </a:xfrm>
           <a:prstGeom prst="rect">
             <a:avLst/>
@@ -31974,21 +31339,21 @@
                 <a:latin typeface="PFDinTextCompPro-Italic"/>
                 <a:cs typeface="PFDinTextCompPro-Italic"/>
               </a:rPr>
-              <a:t>One possibility is </a:t>
+              <a:t>Alternatively we could build the full tree, and then perform </a:t>
             </a:r>
             <a:r>
               <a:rPr lang="en-US" sz="3000" dirty="0" smtClean="0">
                 <a:latin typeface="PFDinTextCompPro-Medium"/>
                 <a:cs typeface="PFDinTextCompPro-Medium"/>
               </a:rPr>
-              <a:t>pre-pruning</a:t>
+              <a:t>pruning</a:t>
             </a:r>
             <a:r>
               <a:rPr lang="en-US" sz="3000" dirty="0" smtClean="0">
                 <a:latin typeface="PFDinTextCompPro-Italic"/>
                 <a:cs typeface="PFDinTextCompPro-Italic"/>
               </a:rPr>
-              <a:t>, which involves setting a minimum threshold on the gain, and stopping when no split achieves a gain above this threshold.</a:t>
+              <a:t> as a post-processing step.</a:t>
             </a:r>
           </a:p>
         </p:txBody>
@@ -31996,7 +31361,7 @@
     </p:spTree>
     <p:extLst>
       <p:ext uri="{BB962C8B-B14F-4D97-AF65-F5344CB8AC3E}">
-        <p14:creationId xmlns:p14="http://schemas.microsoft.com/office/powerpoint/2010/main" val="4246433088"/>
+        <p14:creationId xmlns:p14="http://schemas.microsoft.com/office/powerpoint/2010/main" val="2878499685"/>
       </p:ext>
     </p:extLst>
   </p:cSld>
@@ -32107,7 +31472,7 @@
         <p:spPr>
           <a:xfrm>
             <a:off x="566737" y="1257300"/>
-            <a:ext cx="8153400" cy="2862322"/>
+            <a:ext cx="8153400" cy="2400657"/>
           </a:xfrm>
           <a:prstGeom prst="rect">
             <a:avLst/>
@@ -32122,25 +31487,25 @@
           <a:p>
             <a:pPr algn="l"/>
             <a:r>
-              <a:rPr lang="en-US" sz="3000" dirty="0" smtClean="0">
-                <a:latin typeface="PFDinTextCompPro-Italic"/>
-                <a:cs typeface="PFDinTextCompPro-Italic"/>
-              </a:rPr>
-              <a:t>One possibility is </a:t>
-            </a:r>
-            <a:r>
-              <a:rPr lang="en-US" sz="3000" dirty="0" smtClean="0">
+              <a:rPr lang="en-US" sz="3000" dirty="0">
+                <a:latin typeface="PFDinTextCompPro-Italic"/>
+                <a:cs typeface="PFDinTextCompPro-Italic"/>
+              </a:rPr>
+              <a:t>Alternatively we could build the full tree, and then perform </a:t>
+            </a:r>
+            <a:r>
+              <a:rPr lang="en-US" sz="3000" dirty="0">
                 <a:latin typeface="PFDinTextCompPro-Medium"/>
                 <a:cs typeface="PFDinTextCompPro-Medium"/>
               </a:rPr>
-              <a:t>pre-pruning</a:t>
-            </a:r>
-            <a:r>
-              <a:rPr lang="en-US" sz="3000" dirty="0" smtClean="0">
-                <a:latin typeface="PFDinTextCompPro-Italic"/>
-                <a:cs typeface="PFDinTextCompPro-Italic"/>
-              </a:rPr>
-              <a:t>, which involves setting a minimum threshold on the gain, and stopping when no split achieves a gain above this threshold.</a:t>
+              <a:t>pruning</a:t>
+            </a:r>
+            <a:r>
+              <a:rPr lang="en-US" sz="3000" dirty="0">
+                <a:latin typeface="PFDinTextCompPro-Italic"/>
+                <a:cs typeface="PFDinTextCompPro-Italic"/>
+              </a:rPr>
+              <a:t> as a post-processing step.</a:t>
             </a:r>
           </a:p>
           <a:p>
@@ -32157,21 +31522,7 @@
                 <a:latin typeface="PFDinTextCompPro-Italic"/>
                 <a:cs typeface="PFDinTextCompPro-Italic"/>
               </a:rPr>
-              <a:t>This prevents </a:t>
-            </a:r>
-            <a:r>
-              <a:rPr lang="en-US" sz="3000" dirty="0" err="1" smtClean="0">
-                <a:latin typeface="PFDinTextCompPro-Italic"/>
-                <a:cs typeface="PFDinTextCompPro-Italic"/>
-              </a:rPr>
-              <a:t>overfitting</a:t>
-            </a:r>
-            <a:r>
-              <a:rPr lang="en-US" sz="3000" dirty="0" smtClean="0">
-                <a:latin typeface="PFDinTextCompPro-Italic"/>
-                <a:cs typeface="PFDinTextCompPro-Italic"/>
-              </a:rPr>
-              <a:t>, but is difficult to calibrate in practice (may preserve bias!)</a:t>
+              <a:t>To prune a tree, we examine the nodes from the bottom-up and simplify pieces of the tree (according to some criteria).</a:t>
             </a:r>
           </a:p>
         </p:txBody>
@@ -32179,7 +31530,7 @@
     </p:spTree>
     <p:extLst>
       <p:ext uri="{BB962C8B-B14F-4D97-AF65-F5344CB8AC3E}">
-        <p14:creationId xmlns:p14="http://schemas.microsoft.com/office/powerpoint/2010/main" val="1955138691"/>
+        <p14:creationId xmlns:p14="http://schemas.microsoft.com/office/powerpoint/2010/main" val="1346195382"/>
       </p:ext>
     </p:extLst>
   </p:cSld>
@@ -32309,21 +31660,35 @@
                 <a:latin typeface="PFDinTextCompPro-Italic"/>
                 <a:cs typeface="PFDinTextCompPro-Italic"/>
               </a:rPr>
-              <a:t>Alternatively we could build the full tree, and then perform </a:t>
+              <a:t>Complicated </a:t>
+            </a:r>
+            <a:r>
+              <a:rPr lang="en-US" sz="3000" dirty="0" err="1" smtClean="0">
+                <a:latin typeface="PFDinTextCompPro-Italic"/>
+                <a:cs typeface="PFDinTextCompPro-Italic"/>
+              </a:rPr>
+              <a:t>subtrees</a:t>
             </a:r>
             <a:r>
               <a:rPr lang="en-US" sz="3000" dirty="0" smtClean="0">
-                <a:latin typeface="PFDinTextCompPro-Medium"/>
-                <a:cs typeface="PFDinTextCompPro-Medium"/>
-              </a:rPr>
-              <a:t>pruning</a:t>
+                <a:latin typeface="PFDinTextCompPro-Italic"/>
+                <a:cs typeface="PFDinTextCompPro-Italic"/>
+              </a:rPr>
+              <a:t> can be replaced either with a single node, or with a simpler (child) </a:t>
+            </a:r>
+            <a:r>
+              <a:rPr lang="en-US" sz="3000" dirty="0" err="1" smtClean="0">
+                <a:latin typeface="PFDinTextCompPro-Italic"/>
+                <a:cs typeface="PFDinTextCompPro-Italic"/>
+              </a:rPr>
+              <a:t>subtree</a:t>
             </a:r>
             <a:r>
               <a:rPr lang="en-US" sz="3000" dirty="0" smtClean="0">
                 <a:latin typeface="PFDinTextCompPro-Italic"/>
                 <a:cs typeface="PFDinTextCompPro-Italic"/>
               </a:rPr>
-              <a:t> as a post-processing step.</a:t>
+              <a:t>.</a:t>
             </a:r>
           </a:p>
         </p:txBody>
@@ -32331,7 +31696,7 @@
     </p:spTree>
     <p:extLst>
       <p:ext uri="{BB962C8B-B14F-4D97-AF65-F5344CB8AC3E}">
-        <p14:creationId xmlns:p14="http://schemas.microsoft.com/office/powerpoint/2010/main" val="2878499685"/>
+        <p14:creationId xmlns:p14="http://schemas.microsoft.com/office/powerpoint/2010/main" val="269029376"/>
       </p:ext>
     </p:extLst>
   </p:cSld>
@@ -32457,25 +31822,39 @@
           <a:p>
             <a:pPr algn="l"/>
             <a:r>
-              <a:rPr lang="en-US" sz="3000" dirty="0">
-                <a:latin typeface="PFDinTextCompPro-Italic"/>
-                <a:cs typeface="PFDinTextCompPro-Italic"/>
-              </a:rPr>
-              <a:t>Alternatively we could build the full tree, and then perform </a:t>
-            </a:r>
-            <a:r>
-              <a:rPr lang="en-US" sz="3000" dirty="0">
-                <a:latin typeface="PFDinTextCompPro-Medium"/>
-                <a:cs typeface="PFDinTextCompPro-Medium"/>
-              </a:rPr>
-              <a:t>pruning</a:t>
-            </a:r>
-            <a:r>
-              <a:rPr lang="en-US" sz="3000" dirty="0">
-                <a:latin typeface="PFDinTextCompPro-Italic"/>
-                <a:cs typeface="PFDinTextCompPro-Italic"/>
-              </a:rPr>
-              <a:t> as a post-processing step.</a:t>
+              <a:rPr lang="en-US" sz="3000" dirty="0" smtClean="0">
+                <a:latin typeface="PFDinTextCompPro-Italic"/>
+                <a:cs typeface="PFDinTextCompPro-Italic"/>
+              </a:rPr>
+              <a:t>Complicated </a:t>
+            </a:r>
+            <a:r>
+              <a:rPr lang="en-US" sz="3000" dirty="0" err="1" smtClean="0">
+                <a:latin typeface="PFDinTextCompPro-Italic"/>
+                <a:cs typeface="PFDinTextCompPro-Italic"/>
+              </a:rPr>
+              <a:t>subtrees</a:t>
+            </a:r>
+            <a:r>
+              <a:rPr lang="en-US" sz="3000" dirty="0" smtClean="0">
+                <a:latin typeface="PFDinTextCompPro-Italic"/>
+                <a:cs typeface="PFDinTextCompPro-Italic"/>
+              </a:rPr>
+              <a:t> can be replaced either with a single node, or with a simpler (child) </a:t>
+            </a:r>
+            <a:r>
+              <a:rPr lang="en-US" sz="3000" dirty="0" err="1" smtClean="0">
+                <a:latin typeface="PFDinTextCompPro-Italic"/>
+                <a:cs typeface="PFDinTextCompPro-Italic"/>
+              </a:rPr>
+              <a:t>subtree</a:t>
+            </a:r>
+            <a:r>
+              <a:rPr lang="en-US" sz="3000" dirty="0" smtClean="0">
+                <a:latin typeface="PFDinTextCompPro-Italic"/>
+                <a:cs typeface="PFDinTextCompPro-Italic"/>
+              </a:rPr>
+              <a:t>.</a:t>
             </a:r>
           </a:p>
           <a:p>
@@ -32492,7 +31871,49 @@
                 <a:latin typeface="PFDinTextCompPro-Italic"/>
                 <a:cs typeface="PFDinTextCompPro-Italic"/>
               </a:rPr>
-              <a:t>To prune a tree, we examine the nodes from the bottom-up and simplify pieces of the tree (according to some criteria).</a:t>
+              <a:t>The first approach is called </a:t>
+            </a:r>
+            <a:r>
+              <a:rPr lang="en-US" sz="3000" dirty="0" err="1" smtClean="0">
+                <a:latin typeface="PFDinTextCompPro-Medium"/>
+                <a:cs typeface="PFDinTextCompPro-Medium"/>
+              </a:rPr>
+              <a:t>subtree</a:t>
+            </a:r>
+            <a:r>
+              <a:rPr lang="en-US" sz="3000" dirty="0" smtClean="0">
+                <a:latin typeface="PFDinTextCompPro-Medium"/>
+                <a:cs typeface="PFDinTextCompPro-Medium"/>
+              </a:rPr>
+              <a:t> replacement</a:t>
+            </a:r>
+            <a:r>
+              <a:rPr lang="en-US" sz="3000" dirty="0" smtClean="0">
+                <a:latin typeface="PFDinTextCompPro-Italic"/>
+                <a:cs typeface="PFDinTextCompPro-Italic"/>
+              </a:rPr>
+              <a:t>, and the second is </a:t>
+            </a:r>
+            <a:r>
+              <a:rPr lang="en-US" sz="3000" dirty="0" err="1" smtClean="0">
+                <a:latin typeface="PFDinTextCompPro-Medium"/>
+                <a:cs typeface="PFDinTextCompPro-Medium"/>
+              </a:rPr>
+              <a:t>subtree</a:t>
+            </a:r>
+            <a:r>
+              <a:rPr lang="en-US" sz="3000" dirty="0" smtClean="0">
+                <a:latin typeface="PFDinTextCompPro-Medium"/>
+                <a:cs typeface="PFDinTextCompPro-Medium"/>
+              </a:rPr>
+              <a:t> raising</a:t>
+            </a:r>
+            <a:r>
+              <a:rPr lang="en-US" sz="3000" dirty="0" smtClean="0">
+                <a:latin typeface="PFDinTextCompPro-Italic"/>
+                <a:cs typeface="PFDinTextCompPro-Italic"/>
+              </a:rPr>
+              <a:t>.</a:t>
             </a:r>
           </a:p>
         </p:txBody>
@@ -32500,7 +31921,7 @@
     </p:spTree>
     <p:extLst>
       <p:ext uri="{BB962C8B-B14F-4D97-AF65-F5344CB8AC3E}">
-        <p14:creationId xmlns:p14="http://schemas.microsoft.com/office/powerpoint/2010/main" val="1346195382"/>
+        <p14:creationId xmlns:p14="http://schemas.microsoft.com/office/powerpoint/2010/main" val="1599203381"/>
       </p:ext>
     </p:extLst>
   </p:cSld>
@@ -32562,11 +31983,11 @@
               <a:defRPr/>
             </a:pPr>
             <a:r>
-              <a:rPr lang="en-US" dirty="0"/>
+              <a:rPr lang="en-US" dirty="0" smtClean="0"/>
               <a:t>Preventing </a:t>
             </a:r>
             <a:r>
-              <a:rPr lang="en-US" dirty="0" err="1"/>
+              <a:rPr lang="en-US" dirty="0" err="1" smtClean="0"/>
               <a:t>overfitting</a:t>
             </a:r>
             <a:endParaRPr lang="en-US" dirty="0"/>
@@ -32597,531 +32018,6 @@
                 <a:defRPr/>
               </a:pPr>
               <a:t>79</a:t>
-            </a:fld>
-            <a:endParaRPr lang="en-US"/>
-          </a:p>
-        </p:txBody>
-      </p:sp>
-      <p:sp>
-        <p:nvSpPr>
-          <p:cNvPr id="5" name="TextBox 4"/>
-          <p:cNvSpPr txBox="1"/>
-          <p:nvPr/>
-        </p:nvSpPr>
-        <p:spPr>
-          <a:xfrm>
-            <a:off x="566737" y="1257300"/>
-            <a:ext cx="8153400" cy="1015663"/>
-          </a:xfrm>
-          <a:prstGeom prst="rect">
-            <a:avLst/>
-          </a:prstGeom>
-          <a:noFill/>
-        </p:spPr>
-        <p:txBody>
-          <a:bodyPr wrap="square" rtlCol="0">
-            <a:spAutoFit/>
-          </a:bodyPr>
-          <a:lstStyle/>
-          <a:p>
-            <a:pPr algn="l"/>
-            <a:r>
-              <a:rPr lang="en-US" sz="3000" dirty="0" smtClean="0">
-                <a:latin typeface="PFDinTextCompPro-Italic"/>
-                <a:cs typeface="PFDinTextCompPro-Italic"/>
-              </a:rPr>
-              <a:t>Complicated </a:t>
-            </a:r>
-            <a:r>
-              <a:rPr lang="en-US" sz="3000" dirty="0" err="1" smtClean="0">
-                <a:latin typeface="PFDinTextCompPro-Italic"/>
-                <a:cs typeface="PFDinTextCompPro-Italic"/>
-              </a:rPr>
-              <a:t>subtrees</a:t>
-            </a:r>
-            <a:r>
-              <a:rPr lang="en-US" sz="3000" dirty="0" smtClean="0">
-                <a:latin typeface="PFDinTextCompPro-Italic"/>
-                <a:cs typeface="PFDinTextCompPro-Italic"/>
-              </a:rPr>
-              <a:t> can be replaced either with a single node, or with a simpler (child) </a:t>
-            </a:r>
-            <a:r>
-              <a:rPr lang="en-US" sz="3000" dirty="0" err="1" smtClean="0">
-                <a:latin typeface="PFDinTextCompPro-Italic"/>
-                <a:cs typeface="PFDinTextCompPro-Italic"/>
-              </a:rPr>
-              <a:t>subtree</a:t>
-            </a:r>
-            <a:r>
-              <a:rPr lang="en-US" sz="3000" dirty="0" smtClean="0">
-                <a:latin typeface="PFDinTextCompPro-Italic"/>
-                <a:cs typeface="PFDinTextCompPro-Italic"/>
-              </a:rPr>
-              <a:t>.</a:t>
-            </a:r>
-          </a:p>
-        </p:txBody>
-      </p:sp>
-    </p:spTree>
-    <p:extLst>
-      <p:ext uri="{BB962C8B-B14F-4D97-AF65-F5344CB8AC3E}">
-        <p14:creationId xmlns:p14="http://schemas.microsoft.com/office/powerpoint/2010/main" val="269029376"/>
-      </p:ext>
-    </p:extLst>
-  </p:cSld>
-  <p:clrMapOvr>
-    <a:masterClrMapping/>
-  </p:clrMapOvr>
-  <p:transition xmlns:p14="http://schemas.microsoft.com/office/powerpoint/2010/main"/>
-  <p:timing>
-    <p:tnLst>
-      <p:par>
-        <p:cTn xmlns:p14="http://schemas.microsoft.com/office/powerpoint/2010/main" id="1" dur="indefinite" restart="never" nodeType="tmRoot"/>
-      </p:par>
-    </p:tnLst>
-  </p:timing>
-</p:sld>
-</file>
-
-<file path=ppt/slides/slide8.xml><?xml version="1.0" encoding="utf-8"?>
-<p:sld xmlns:a="http://schemas.openxmlformats.org/drawingml/2006/main" xmlns:r="http://schemas.openxmlformats.org/officeDocument/2006/relationships" xmlns:p="http://schemas.openxmlformats.org/presentationml/2006/main">
-  <p:cSld>
-    <p:spTree>
-      <p:nvGrpSpPr>
-        <p:cNvPr id="1" name=""/>
-        <p:cNvGrpSpPr/>
-        <p:nvPr/>
-      </p:nvGrpSpPr>
-      <p:grpSpPr>
-        <a:xfrm>
-          <a:off x="0" y="0"/>
-          <a:ext cx="0" cy="0"/>
-          <a:chOff x="0" y="0"/>
-          <a:chExt cx="0" cy="0"/>
-        </a:xfrm>
-      </p:grpSpPr>
-      <p:sp>
-        <p:nvSpPr>
-          <p:cNvPr id="4" name="Content Placeholder 3"/>
-          <p:cNvSpPr>
-            <a:spLocks noGrp="1"/>
-          </p:cNvSpPr>
-          <p:nvPr>
-            <p:ph sz="quarter" idx="11"/>
-          </p:nvPr>
-        </p:nvSpPr>
-        <p:spPr>
-          <a:xfrm>
-            <a:off x="414337" y="495300"/>
-            <a:ext cx="6400800" cy="304800"/>
-          </a:xfrm>
-        </p:spPr>
-        <p:txBody>
-          <a:bodyPr/>
-          <a:lstStyle/>
-          <a:p>
-            <a:pPr eaLnBrk="1" hangingPunct="1">
-              <a:lnSpc>
-                <a:spcPts val="2448"/>
-              </a:lnSpc>
-              <a:defRPr/>
-            </a:pPr>
-            <a:r>
-              <a:rPr lang="en-US" dirty="0" smtClean="0"/>
-              <a:t>Decision tree classifiers</a:t>
-            </a:r>
-            <a:endParaRPr lang="en-US" dirty="0"/>
-          </a:p>
-        </p:txBody>
-      </p:sp>
-      <p:sp>
-        <p:nvSpPr>
-          <p:cNvPr id="8" name="Slide Number Placeholder 3"/>
-          <p:cNvSpPr>
-            <a:spLocks noGrp="1"/>
-          </p:cNvSpPr>
-          <p:nvPr>
-            <p:ph type="sldNum" sz="quarter" idx="13"/>
-          </p:nvPr>
-        </p:nvSpPr>
-        <p:spPr/>
-        <p:txBody>
-          <a:bodyPr/>
-          <a:lstStyle/>
-          <a:p>
-            <a:pPr>
-              <a:defRPr/>
-            </a:pPr>
-            <a:fld id="{BD5AD749-DAD1-6A4A-A2AA-CB20EAD0AEB7}" type="slidenum">
-              <a:rPr lang="en-US"/>
-              <a:pPr>
-                <a:defRPr/>
-              </a:pPr>
-              <a:t>8</a:t>
-            </a:fld>
-            <a:endParaRPr lang="en-US"/>
-          </a:p>
-        </p:txBody>
-      </p:sp>
-      <p:sp>
-        <p:nvSpPr>
-          <p:cNvPr id="9" name="TextBox 8"/>
-          <p:cNvSpPr txBox="1"/>
-          <p:nvPr/>
-        </p:nvSpPr>
-        <p:spPr>
-          <a:xfrm>
-            <a:off x="566737" y="1104900"/>
-            <a:ext cx="8382000" cy="553998"/>
-          </a:xfrm>
-          <a:prstGeom prst="rect">
-            <a:avLst/>
-          </a:prstGeom>
-          <a:noFill/>
-        </p:spPr>
-        <p:txBody>
-          <a:bodyPr wrap="square" rtlCol="0">
-            <a:spAutoFit/>
-          </a:bodyPr>
-          <a:lstStyle/>
-          <a:p>
-            <a:pPr algn="l"/>
-            <a:r>
-              <a:rPr lang="en-US" sz="3000" dirty="0" smtClean="0">
-                <a:latin typeface="PFDinTextCompPro-Italic"/>
-                <a:cs typeface="PFDinTextCompPro-Italic"/>
-              </a:rPr>
-              <a:t>Q:  How is a decision tree represented?</a:t>
-            </a:r>
-          </a:p>
-        </p:txBody>
-      </p:sp>
-    </p:spTree>
-    <p:extLst>
-      <p:ext uri="{BB962C8B-B14F-4D97-AF65-F5344CB8AC3E}">
-        <p14:creationId xmlns:p14="http://schemas.microsoft.com/office/powerpoint/2010/main" val="3978169271"/>
-      </p:ext>
-    </p:extLst>
-  </p:cSld>
-  <p:clrMapOvr>
-    <a:masterClrMapping/>
-  </p:clrMapOvr>
-  <p:transition xmlns:p14="http://schemas.microsoft.com/office/powerpoint/2010/main"/>
-  <p:timing>
-    <p:tnLst>
-      <p:par>
-        <p:cTn xmlns:p14="http://schemas.microsoft.com/office/powerpoint/2010/main" id="1" dur="indefinite" restart="never" nodeType="tmRoot"/>
-      </p:par>
-    </p:tnLst>
-  </p:timing>
-</p:sld>
-</file>
-
-<file path=ppt/slides/slide80.xml><?xml version="1.0" encoding="utf-8"?>
-<p:sld xmlns:a="http://schemas.openxmlformats.org/drawingml/2006/main" xmlns:r="http://schemas.openxmlformats.org/officeDocument/2006/relationships" xmlns:p="http://schemas.openxmlformats.org/presentationml/2006/main">
-  <p:cSld>
-    <p:spTree>
-      <p:nvGrpSpPr>
-        <p:cNvPr id="1" name=""/>
-        <p:cNvGrpSpPr/>
-        <p:nvPr/>
-      </p:nvGrpSpPr>
-      <p:grpSpPr>
-        <a:xfrm>
-          <a:off x="0" y="0"/>
-          <a:ext cx="0" cy="0"/>
-          <a:chOff x="0" y="0"/>
-          <a:chExt cx="0" cy="0"/>
-        </a:xfrm>
-      </p:grpSpPr>
-      <p:sp>
-        <p:nvSpPr>
-          <p:cNvPr id="4" name="Content Placeholder 3"/>
-          <p:cNvSpPr>
-            <a:spLocks noGrp="1"/>
-          </p:cNvSpPr>
-          <p:nvPr>
-            <p:ph sz="quarter" idx="11"/>
-          </p:nvPr>
-        </p:nvSpPr>
-        <p:spPr>
-          <a:xfrm>
-            <a:off x="414337" y="495300"/>
-            <a:ext cx="6400800" cy="304800"/>
-          </a:xfrm>
-        </p:spPr>
-        <p:txBody>
-          <a:bodyPr/>
-          <a:lstStyle/>
-          <a:p>
-            <a:pPr eaLnBrk="1" hangingPunct="1">
-              <a:lnSpc>
-                <a:spcPts val="2448"/>
-              </a:lnSpc>
-              <a:defRPr/>
-            </a:pPr>
-            <a:r>
-              <a:rPr lang="en-US" dirty="0"/>
-              <a:t>Preventing </a:t>
-            </a:r>
-            <a:r>
-              <a:rPr lang="en-US" dirty="0" err="1"/>
-              <a:t>overfitting</a:t>
-            </a:r>
-            <a:endParaRPr lang="en-US" dirty="0"/>
-          </a:p>
-        </p:txBody>
-      </p:sp>
-      <p:sp>
-        <p:nvSpPr>
-          <p:cNvPr id="8" name="Slide Number Placeholder 3"/>
-          <p:cNvSpPr>
-            <a:spLocks noGrp="1"/>
-          </p:cNvSpPr>
-          <p:nvPr>
-            <p:ph type="sldNum" sz="quarter" idx="13"/>
-          </p:nvPr>
-        </p:nvSpPr>
-        <p:spPr/>
-        <p:txBody>
-          <a:bodyPr/>
-          <a:lstStyle/>
-          <a:p>
-            <a:pPr>
-              <a:defRPr/>
-            </a:pPr>
-            <a:fld id="{BD5AD749-DAD1-6A4A-A2AA-CB20EAD0AEB7}" type="slidenum">
-              <a:rPr lang="en-US"/>
-              <a:pPr>
-                <a:defRPr/>
-              </a:pPr>
-              <a:t>80</a:t>
-            </a:fld>
-            <a:endParaRPr lang="en-US"/>
-          </a:p>
-        </p:txBody>
-      </p:sp>
-      <p:sp>
-        <p:nvSpPr>
-          <p:cNvPr id="5" name="TextBox 4"/>
-          <p:cNvSpPr txBox="1"/>
-          <p:nvPr/>
-        </p:nvSpPr>
-        <p:spPr>
-          <a:xfrm>
-            <a:off x="566737" y="1257300"/>
-            <a:ext cx="8153400" cy="2400657"/>
-          </a:xfrm>
-          <a:prstGeom prst="rect">
-            <a:avLst/>
-          </a:prstGeom>
-          <a:noFill/>
-        </p:spPr>
-        <p:txBody>
-          <a:bodyPr wrap="square" rtlCol="0">
-            <a:spAutoFit/>
-          </a:bodyPr>
-          <a:lstStyle/>
-          <a:p>
-            <a:pPr algn="l"/>
-            <a:r>
-              <a:rPr lang="en-US" sz="3000" dirty="0" smtClean="0">
-                <a:latin typeface="PFDinTextCompPro-Italic"/>
-                <a:cs typeface="PFDinTextCompPro-Italic"/>
-              </a:rPr>
-              <a:t>Complicated </a:t>
-            </a:r>
-            <a:r>
-              <a:rPr lang="en-US" sz="3000" dirty="0" err="1" smtClean="0">
-                <a:latin typeface="PFDinTextCompPro-Italic"/>
-                <a:cs typeface="PFDinTextCompPro-Italic"/>
-              </a:rPr>
-              <a:t>subtrees</a:t>
-            </a:r>
-            <a:r>
-              <a:rPr lang="en-US" sz="3000" dirty="0" smtClean="0">
-                <a:latin typeface="PFDinTextCompPro-Italic"/>
-                <a:cs typeface="PFDinTextCompPro-Italic"/>
-              </a:rPr>
-              <a:t> can be replaced either with a single node, or with a simpler (child) </a:t>
-            </a:r>
-            <a:r>
-              <a:rPr lang="en-US" sz="3000" dirty="0" err="1" smtClean="0">
-                <a:latin typeface="PFDinTextCompPro-Italic"/>
-                <a:cs typeface="PFDinTextCompPro-Italic"/>
-              </a:rPr>
-              <a:t>subtree</a:t>
-            </a:r>
-            <a:r>
-              <a:rPr lang="en-US" sz="3000" dirty="0" smtClean="0">
-                <a:latin typeface="PFDinTextCompPro-Italic"/>
-                <a:cs typeface="PFDinTextCompPro-Italic"/>
-              </a:rPr>
-              <a:t>.</a:t>
-            </a:r>
-          </a:p>
-          <a:p>
-            <a:pPr algn="l"/>
-            <a:endParaRPr lang="en-US" sz="3000" dirty="0">
-              <a:latin typeface="PFDinTextCompPro-Italic"/>
-              <a:cs typeface="PFDinTextCompPro-Italic"/>
-            </a:endParaRPr>
-          </a:p>
-          <a:p>
-            <a:pPr algn="l"/>
-            <a:r>
-              <a:rPr lang="en-US" sz="3000" dirty="0" smtClean="0">
-                <a:latin typeface="PFDinTextCompPro-Italic"/>
-                <a:cs typeface="PFDinTextCompPro-Italic"/>
-              </a:rPr>
-              <a:t>The first approach is called </a:t>
-            </a:r>
-            <a:r>
-              <a:rPr lang="en-US" sz="3000" dirty="0" err="1" smtClean="0">
-                <a:latin typeface="PFDinTextCompPro-Medium"/>
-                <a:cs typeface="PFDinTextCompPro-Medium"/>
-              </a:rPr>
-              <a:t>subtree</a:t>
-            </a:r>
-            <a:r>
-              <a:rPr lang="en-US" sz="3000" dirty="0" smtClean="0">
-                <a:latin typeface="PFDinTextCompPro-Medium"/>
-                <a:cs typeface="PFDinTextCompPro-Medium"/>
-              </a:rPr>
-              <a:t> replacement</a:t>
-            </a:r>
-            <a:r>
-              <a:rPr lang="en-US" sz="3000" dirty="0" smtClean="0">
-                <a:latin typeface="PFDinTextCompPro-Italic"/>
-                <a:cs typeface="PFDinTextCompPro-Italic"/>
-              </a:rPr>
-              <a:t>, and the second is </a:t>
-            </a:r>
-            <a:r>
-              <a:rPr lang="en-US" sz="3000" dirty="0" err="1" smtClean="0">
-                <a:latin typeface="PFDinTextCompPro-Medium"/>
-                <a:cs typeface="PFDinTextCompPro-Medium"/>
-              </a:rPr>
-              <a:t>subtree</a:t>
-            </a:r>
-            <a:r>
-              <a:rPr lang="en-US" sz="3000" dirty="0" smtClean="0">
-                <a:latin typeface="PFDinTextCompPro-Medium"/>
-                <a:cs typeface="PFDinTextCompPro-Medium"/>
-              </a:rPr>
-              <a:t> raising</a:t>
-            </a:r>
-            <a:r>
-              <a:rPr lang="en-US" sz="3000" dirty="0" smtClean="0">
-                <a:latin typeface="PFDinTextCompPro-Italic"/>
-                <a:cs typeface="PFDinTextCompPro-Italic"/>
-              </a:rPr>
-              <a:t>.</a:t>
-            </a:r>
-          </a:p>
-        </p:txBody>
-      </p:sp>
-    </p:spTree>
-    <p:extLst>
-      <p:ext uri="{BB962C8B-B14F-4D97-AF65-F5344CB8AC3E}">
-        <p14:creationId xmlns:p14="http://schemas.microsoft.com/office/powerpoint/2010/main" val="1599203381"/>
-      </p:ext>
-    </p:extLst>
-  </p:cSld>
-  <p:clrMapOvr>
-    <a:masterClrMapping/>
-  </p:clrMapOvr>
-  <p:transition xmlns:p14="http://schemas.microsoft.com/office/powerpoint/2010/main"/>
-  <p:timing>
-    <p:tnLst>
-      <p:par>
-        <p:cTn xmlns:p14="http://schemas.microsoft.com/office/powerpoint/2010/main" id="1" dur="indefinite" restart="never" nodeType="tmRoot"/>
-      </p:par>
-    </p:tnLst>
-  </p:timing>
-</p:sld>
-</file>
-
-<file path=ppt/slides/slide81.xml><?xml version="1.0" encoding="utf-8"?>
-<p:sld xmlns:a="http://schemas.openxmlformats.org/drawingml/2006/main" xmlns:r="http://schemas.openxmlformats.org/officeDocument/2006/relationships" xmlns:p="http://schemas.openxmlformats.org/presentationml/2006/main">
-  <p:cSld>
-    <p:spTree>
-      <p:nvGrpSpPr>
-        <p:cNvPr id="1" name=""/>
-        <p:cNvGrpSpPr/>
-        <p:nvPr/>
-      </p:nvGrpSpPr>
-      <p:grpSpPr>
-        <a:xfrm>
-          <a:off x="0" y="0"/>
-          <a:ext cx="0" cy="0"/>
-          <a:chOff x="0" y="0"/>
-          <a:chExt cx="0" cy="0"/>
-        </a:xfrm>
-      </p:grpSpPr>
-      <p:sp>
-        <p:nvSpPr>
-          <p:cNvPr id="4" name="Content Placeholder 3"/>
-          <p:cNvSpPr>
-            <a:spLocks noGrp="1"/>
-          </p:cNvSpPr>
-          <p:nvPr>
-            <p:ph sz="quarter" idx="11"/>
-          </p:nvPr>
-        </p:nvSpPr>
-        <p:spPr>
-          <a:xfrm>
-            <a:off x="414337" y="495300"/>
-            <a:ext cx="6400800" cy="304800"/>
-          </a:xfrm>
-        </p:spPr>
-        <p:txBody>
-          <a:bodyPr/>
-          <a:lstStyle/>
-          <a:p>
-            <a:pPr eaLnBrk="1" hangingPunct="1">
-              <a:lnSpc>
-                <a:spcPts val="2448"/>
-              </a:lnSpc>
-              <a:defRPr/>
-            </a:pPr>
-            <a:r>
-              <a:rPr lang="en-US" dirty="0" smtClean="0"/>
-              <a:t>Preventing </a:t>
-            </a:r>
-            <a:r>
-              <a:rPr lang="en-US" dirty="0" err="1" smtClean="0"/>
-              <a:t>overfitting</a:t>
-            </a:r>
-            <a:endParaRPr lang="en-US" dirty="0"/>
-          </a:p>
-        </p:txBody>
-      </p:sp>
-      <p:sp>
-        <p:nvSpPr>
-          <p:cNvPr id="8" name="Slide Number Placeholder 3"/>
-          <p:cNvSpPr>
-            <a:spLocks noGrp="1"/>
-          </p:cNvSpPr>
-          <p:nvPr>
-            <p:ph type="sldNum" sz="quarter" idx="13"/>
-          </p:nvPr>
-        </p:nvSpPr>
-        <p:spPr/>
-        <p:txBody>
-          <a:bodyPr/>
-          <a:lstStyle/>
-          <a:p>
-            <a:pPr>
-              <a:defRPr/>
-            </a:pPr>
-            <a:fld id="{BD5AD749-DAD1-6A4A-A2AA-CB20EAD0AEB7}" type="slidenum">
-              <a:rPr lang="en-US"/>
-              <a:pPr>
-                <a:defRPr/>
-              </a:pPr>
-              <a:t>81</a:t>
             </a:fld>
             <a:endParaRPr lang="en-US"/>
           </a:p>
@@ -33172,7 +32068,7 @@
 </p:sld>
 </file>
 
-<file path=ppt/slides/slide82.xml><?xml version="1.0" encoding="utf-8"?>
+<file path=ppt/slides/slide8.xml><?xml version="1.0" encoding="utf-8"?>
 <p:sld xmlns:a="http://schemas.openxmlformats.org/drawingml/2006/main" xmlns:r="http://schemas.openxmlformats.org/officeDocument/2006/relationships" xmlns:p="http://schemas.openxmlformats.org/presentationml/2006/main">
   <p:cSld>
     <p:spTree>
@@ -33216,12 +32112,8 @@
               <a:defRPr/>
             </a:pPr>
             <a:r>
-              <a:rPr lang="en-US" dirty="0"/>
-              <a:t>Preventing </a:t>
-            </a:r>
-            <a:r>
-              <a:rPr lang="en-US" dirty="0" err="1"/>
-              <a:t>overfitting</a:t>
+              <a:rPr lang="en-US" dirty="0" smtClean="0"/>
+              <a:t>Decision tree classifiers</a:t>
             </a:r>
             <a:endParaRPr lang="en-US" dirty="0"/>
           </a:p>
@@ -33250,7 +32142,145 @@
               <a:pPr>
                 <a:defRPr/>
               </a:pPr>
-              <a:t>82</a:t>
+              <a:t>8</a:t>
+            </a:fld>
+            <a:endParaRPr lang="en-US"/>
+          </a:p>
+        </p:txBody>
+      </p:sp>
+      <p:sp>
+        <p:nvSpPr>
+          <p:cNvPr id="9" name="TextBox 8"/>
+          <p:cNvSpPr txBox="1"/>
+          <p:nvPr/>
+        </p:nvSpPr>
+        <p:spPr>
+          <a:xfrm>
+            <a:off x="566737" y="1104900"/>
+            <a:ext cx="8382000" cy="553998"/>
+          </a:xfrm>
+          <a:prstGeom prst="rect">
+            <a:avLst/>
+          </a:prstGeom>
+          <a:noFill/>
+        </p:spPr>
+        <p:txBody>
+          <a:bodyPr wrap="square" rtlCol="0">
+            <a:spAutoFit/>
+          </a:bodyPr>
+          <a:lstStyle/>
+          <a:p>
+            <a:pPr algn="l"/>
+            <a:r>
+              <a:rPr lang="en-US" sz="3000" dirty="0" smtClean="0">
+                <a:latin typeface="PFDinTextCompPro-Italic"/>
+                <a:cs typeface="PFDinTextCompPro-Italic"/>
+              </a:rPr>
+              <a:t>Q:  How is a decision tree represented?</a:t>
+            </a:r>
+          </a:p>
+        </p:txBody>
+      </p:sp>
+    </p:spTree>
+    <p:extLst>
+      <p:ext uri="{BB962C8B-B14F-4D97-AF65-F5344CB8AC3E}">
+        <p14:creationId xmlns:p14="http://schemas.microsoft.com/office/powerpoint/2010/main" val="3978169271"/>
+      </p:ext>
+    </p:extLst>
+  </p:cSld>
+  <p:clrMapOvr>
+    <a:masterClrMapping/>
+  </p:clrMapOvr>
+  <p:transition xmlns:p14="http://schemas.microsoft.com/office/powerpoint/2010/main"/>
+  <p:timing>
+    <p:tnLst>
+      <p:par>
+        <p:cTn xmlns:p14="http://schemas.microsoft.com/office/powerpoint/2010/main" id="1" dur="indefinite" restart="never" nodeType="tmRoot"/>
+      </p:par>
+    </p:tnLst>
+  </p:timing>
+</p:sld>
+</file>
+
+<file path=ppt/slides/slide80.xml><?xml version="1.0" encoding="utf-8"?>
+<p:sld xmlns:a="http://schemas.openxmlformats.org/drawingml/2006/main" xmlns:r="http://schemas.openxmlformats.org/officeDocument/2006/relationships" xmlns:p="http://schemas.openxmlformats.org/presentationml/2006/main">
+  <p:cSld>
+    <p:spTree>
+      <p:nvGrpSpPr>
+        <p:cNvPr id="1" name=""/>
+        <p:cNvGrpSpPr/>
+        <p:nvPr/>
+      </p:nvGrpSpPr>
+      <p:grpSpPr>
+        <a:xfrm>
+          <a:off x="0" y="0"/>
+          <a:ext cx="0" cy="0"/>
+          <a:chOff x="0" y="0"/>
+          <a:chExt cx="0" cy="0"/>
+        </a:xfrm>
+      </p:grpSpPr>
+      <p:sp>
+        <p:nvSpPr>
+          <p:cNvPr id="4" name="Content Placeholder 3"/>
+          <p:cNvSpPr>
+            <a:spLocks noGrp="1"/>
+          </p:cNvSpPr>
+          <p:nvPr>
+            <p:ph sz="quarter" idx="11"/>
+          </p:nvPr>
+        </p:nvSpPr>
+        <p:spPr>
+          <a:xfrm>
+            <a:off x="414337" y="495300"/>
+            <a:ext cx="6400800" cy="304800"/>
+          </a:xfrm>
+        </p:spPr>
+        <p:txBody>
+          <a:bodyPr/>
+          <a:lstStyle/>
+          <a:p>
+            <a:pPr eaLnBrk="1" hangingPunct="1">
+              <a:lnSpc>
+                <a:spcPts val="2448"/>
+              </a:lnSpc>
+              <a:defRPr/>
+            </a:pPr>
+            <a:r>
+              <a:rPr lang="en-US" dirty="0"/>
+              <a:t>Preventing </a:t>
+            </a:r>
+            <a:r>
+              <a:rPr lang="en-US" dirty="0" err="1"/>
+              <a:t>overfitting</a:t>
+            </a:r>
+            <a:endParaRPr lang="en-US" dirty="0"/>
+          </a:p>
+        </p:txBody>
+      </p:sp>
+      <p:sp>
+        <p:nvSpPr>
+          <p:cNvPr id="8" name="Slide Number Placeholder 3"/>
+          <p:cNvSpPr>
+            <a:spLocks noGrp="1"/>
+          </p:cNvSpPr>
+          <p:nvPr>
+            <p:ph type="sldNum" sz="quarter" idx="13"/>
+          </p:nvPr>
+        </p:nvSpPr>
+        <p:spPr/>
+        <p:txBody>
+          <a:bodyPr/>
+          <a:lstStyle/>
+          <a:p>
+            <a:pPr>
+              <a:defRPr/>
+            </a:pPr>
+            <a:fld id="{BD5AD749-DAD1-6A4A-A2AA-CB20EAD0AEB7}" type="slidenum">
+              <a:rPr lang="en-US"/>
+              <a:pPr>
+                <a:defRPr/>
+              </a:pPr>
+              <a:t>80</a:t>
             </a:fld>
             <a:endParaRPr lang="en-US"/>
           </a:p>
@@ -33362,10 +32392,6 @@
               </a:rPr>
               <a:t>-learn.</a:t>
             </a:r>
-            <a:endParaRPr lang="en-US" sz="3000" dirty="0" smtClean="0">
-              <a:latin typeface="PFDinTextCompPro-Italic"/>
-              <a:cs typeface="PFDinTextCompPro-Italic"/>
-            </a:endParaRPr>
           </a:p>
         </p:txBody>
       </p:sp>
@@ -33390,7 +32416,7 @@
 </p:sld>
 </file>
 
-<file path=ppt/slides/slide83.xml><?xml version="1.0" encoding="utf-8"?>
+<file path=ppt/slides/slide81.xml><?xml version="1.0" encoding="utf-8"?>
 <p:sld xmlns:a="http://schemas.openxmlformats.org/drawingml/2006/main" xmlns:r="http://schemas.openxmlformats.org/officeDocument/2006/relationships" xmlns:p="http://schemas.openxmlformats.org/presentationml/2006/main">
   <p:cSld>
     <p:spTree>

</xml_diff>